<commit_message>
Added some new exercises and fixed typos
</commit_message>
<xml_diff>
--- a/presentation/Schematron Tutorial DA 2022.pptx
+++ b/presentation/Schematron Tutorial DA 2022.pptx
@@ -5,10 +5,10 @@
     <p:sldMasterId id="2147483648" r:id="rId1"/>
   </p:sldMasterIdLst>
   <p:notesMasterIdLst>
-    <p:notesMasterId r:id="rId45"/>
+    <p:notesMasterId r:id="rId50"/>
   </p:notesMasterIdLst>
   <p:handoutMasterIdLst>
-    <p:handoutMasterId r:id="rId46"/>
+    <p:handoutMasterId r:id="rId51"/>
   </p:handoutMasterIdLst>
   <p:sldIdLst>
     <p:sldId id="256" r:id="rId2"/>
@@ -40,20 +40,25 @@
     <p:sldId id="403" r:id="rId28"/>
     <p:sldId id="404" r:id="rId29"/>
     <p:sldId id="405" r:id="rId30"/>
-    <p:sldId id="389" r:id="rId31"/>
-    <p:sldId id="269" r:id="rId32"/>
-    <p:sldId id="270" r:id="rId33"/>
-    <p:sldId id="272" r:id="rId34"/>
-    <p:sldId id="274" r:id="rId35"/>
-    <p:sldId id="275" r:id="rId36"/>
-    <p:sldId id="276" r:id="rId37"/>
-    <p:sldId id="278" r:id="rId38"/>
-    <p:sldId id="279" r:id="rId39"/>
-    <p:sldId id="399" r:id="rId40"/>
-    <p:sldId id="277" r:id="rId41"/>
-    <p:sldId id="356" r:id="rId42"/>
-    <p:sldId id="273" r:id="rId43"/>
-    <p:sldId id="283" r:id="rId44"/>
+    <p:sldId id="407" r:id="rId31"/>
+    <p:sldId id="408" r:id="rId32"/>
+    <p:sldId id="409" r:id="rId33"/>
+    <p:sldId id="410" r:id="rId34"/>
+    <p:sldId id="411" r:id="rId35"/>
+    <p:sldId id="389" r:id="rId36"/>
+    <p:sldId id="269" r:id="rId37"/>
+    <p:sldId id="270" r:id="rId38"/>
+    <p:sldId id="272" r:id="rId39"/>
+    <p:sldId id="274" r:id="rId40"/>
+    <p:sldId id="275" r:id="rId41"/>
+    <p:sldId id="276" r:id="rId42"/>
+    <p:sldId id="278" r:id="rId43"/>
+    <p:sldId id="279" r:id="rId44"/>
+    <p:sldId id="399" r:id="rId45"/>
+    <p:sldId id="277" r:id="rId46"/>
+    <p:sldId id="356" r:id="rId47"/>
+    <p:sldId id="273" r:id="rId48"/>
+    <p:sldId id="283" r:id="rId49"/>
   </p:sldIdLst>
   <p:sldSz cx="12192000" cy="6858000"/>
   <p:notesSz cx="6858000" cy="9144000"/>
@@ -206,6 +211,11 @@
             <p14:sldId id="403"/>
             <p14:sldId id="404"/>
             <p14:sldId id="405"/>
+            <p14:sldId id="407"/>
+            <p14:sldId id="408"/>
+            <p14:sldId id="409"/>
+            <p14:sldId id="410"/>
+            <p14:sldId id="411"/>
           </p14:sldIdLst>
         </p14:section>
         <p14:section name="QLB" id="{649F9382-6975-40E2-ABF7-F3BD28E8FFB6}">
@@ -336,7 +346,7 @@
           <a:p>
             <a:fld id="{0AAE6376-87C4-4D16-82D1-D37904F930BA}" type="datetimeFigureOut">
               <a:rPr lang="en-NL" smtClean="0"/>
-              <a:t>25/10/2022</a:t>
+              <a:t>03/11/2022</a:t>
             </a:fld>
             <a:endParaRPr lang="en-NL"/>
           </a:p>
@@ -513,7 +523,7 @@
           <a:p>
             <a:fld id="{3FA52A83-AFF0-44B5-B0CB-BF1EF92BF110}" type="datetimeFigureOut">
               <a:rPr lang="en-NL" smtClean="0"/>
-              <a:t>25/10/2022</a:t>
+              <a:t>03/11/2022</a:t>
             </a:fld>
             <a:endParaRPr lang="en-NL"/>
           </a:p>
@@ -930,7 +940,7 @@
           <a:p>
             <a:fld id="{210C85D1-D769-4E3C-BD67-6FCFE11EFBEA}" type="slidenum">
               <a:rPr lang="en-NL" smtClean="0"/>
-              <a:t>31</a:t>
+              <a:t>32</a:t>
             </a:fld>
             <a:endParaRPr lang="en-NL"/>
           </a:p>
@@ -939,7 +949,7 @@
     </p:spTree>
     <p:extLst>
       <p:ext uri="{BB962C8B-B14F-4D97-AF65-F5344CB8AC3E}">
-        <p14:creationId xmlns:p14="http://schemas.microsoft.com/office/powerpoint/2010/main" val="890139119"/>
+        <p14:creationId xmlns:p14="http://schemas.microsoft.com/office/powerpoint/2010/main" val="915402421"/>
       </p:ext>
     </p:extLst>
   </p:cSld>
@@ -993,63 +1003,6 @@
           <a:bodyPr/>
           <a:lstStyle/>
           <a:p>
-            <a:r>
-              <a:rPr lang="en-US" dirty="0"/>
-              <a:t>Some are outdated:</a:t>
-            </a:r>
-          </a:p>
-          <a:p>
-            <a:pPr marL="171450" indent="-171450">
-              <a:buFont typeface="Arial" panose="020B0604020202020204" pitchFamily="34" charset="0"/>
-              <a:buChar char="•"/>
-            </a:pPr>
-            <a:r>
-              <a:rPr lang="en-US" dirty="0" err="1"/>
-              <a:t>exslt</a:t>
-            </a:r>
-            <a:r>
-              <a:rPr lang="en-US" dirty="0"/>
-              <a:t>: Allow </a:t>
-            </a:r>
-            <a:r>
-              <a:rPr lang="en-US" dirty="0" err="1"/>
-              <a:t>exslt</a:t>
-            </a:r>
-            <a:r>
-              <a:rPr lang="en-US" dirty="0"/>
-              <a:t> extension function from exslt.org (last updated: 2003)</a:t>
-            </a:r>
-          </a:p>
-          <a:p>
-            <a:pPr marL="171450" indent="-171450">
-              <a:buFont typeface="Arial" panose="020B0604020202020204" pitchFamily="34" charset="0"/>
-              <a:buChar char="•"/>
-            </a:pPr>
-            <a:r>
-              <a:rPr lang="en-US" dirty="0" err="1"/>
-              <a:t>stx</a:t>
-            </a:r>
-            <a:r>
-              <a:rPr lang="en-US" dirty="0"/>
-              <a:t> (Streaming Transformations for XML) an XML based language for transforming XML documents without building a tree in memory (last update: 2007)</a:t>
-            </a:r>
-          </a:p>
-          <a:p>
-            <a:pPr marL="171450" indent="-171450">
-              <a:buFont typeface="Arial" panose="020B0604020202020204" pitchFamily="34" charset="0"/>
-              <a:buChar char="•"/>
-            </a:pPr>
-            <a:endParaRPr lang="en-US" dirty="0"/>
-          </a:p>
-          <a:p>
-            <a:pPr marL="0" indent="0">
-              <a:buFont typeface="Arial" panose="020B0604020202020204" pitchFamily="34" charset="0"/>
-              <a:buNone/>
-            </a:pPr>
-            <a:r>
-              <a:rPr lang="en-US" dirty="0"/>
-              <a:t>Contrary to what you might expect: not case-sensitive </a:t>
-            </a:r>
             <a:endParaRPr lang="en-NL" dirty="0"/>
           </a:p>
         </p:txBody>
@@ -1069,9 +1022,9 @@
           <a:bodyPr/>
           <a:lstStyle/>
           <a:p>
-            <a:fld id="{A83FDDBB-341F-4A2D-A070-8A29B8B1C9DF}" type="slidenum">
+            <a:fld id="{210C85D1-D769-4E3C-BD67-6FCFE11EFBEA}" type="slidenum">
               <a:rPr lang="en-NL" smtClean="0"/>
-              <a:t>32</a:t>
+              <a:t>34</a:t>
             </a:fld>
             <a:endParaRPr lang="en-NL"/>
           </a:p>
@@ -1080,7 +1033,7 @@
     </p:spTree>
     <p:extLst>
       <p:ext uri="{BB962C8B-B14F-4D97-AF65-F5344CB8AC3E}">
-        <p14:creationId xmlns:p14="http://schemas.microsoft.com/office/powerpoint/2010/main" val="1888077813"/>
+        <p14:creationId xmlns:p14="http://schemas.microsoft.com/office/powerpoint/2010/main" val="4183750142"/>
       </p:ext>
     </p:extLst>
   </p:cSld>
@@ -1155,7 +1108,7 @@
           <a:p>
             <a:fld id="{210C85D1-D769-4E3C-BD67-6FCFE11EFBEA}" type="slidenum">
               <a:rPr lang="en-NL" smtClean="0"/>
-              <a:t>39</a:t>
+              <a:t>36</a:t>
             </a:fld>
             <a:endParaRPr lang="en-NL"/>
           </a:p>
@@ -1164,7 +1117,7 @@
     </p:spTree>
     <p:extLst>
       <p:ext uri="{BB962C8B-B14F-4D97-AF65-F5344CB8AC3E}">
-        <p14:creationId xmlns:p14="http://schemas.microsoft.com/office/powerpoint/2010/main" val="3823199839"/>
+        <p14:creationId xmlns:p14="http://schemas.microsoft.com/office/powerpoint/2010/main" val="890139119"/>
       </p:ext>
     </p:extLst>
   </p:cSld>
@@ -1218,6 +1171,63 @@
           <a:bodyPr/>
           <a:lstStyle/>
           <a:p>
+            <a:r>
+              <a:rPr lang="en-US" dirty="0"/>
+              <a:t>Some are outdated:</a:t>
+            </a:r>
+          </a:p>
+          <a:p>
+            <a:pPr marL="171450" indent="-171450">
+              <a:buFont typeface="Arial" panose="020B0604020202020204" pitchFamily="34" charset="0"/>
+              <a:buChar char="•"/>
+            </a:pPr>
+            <a:r>
+              <a:rPr lang="en-US" dirty="0" err="1"/>
+              <a:t>exslt</a:t>
+            </a:r>
+            <a:r>
+              <a:rPr lang="en-US" dirty="0"/>
+              <a:t>: Allow </a:t>
+            </a:r>
+            <a:r>
+              <a:rPr lang="en-US" dirty="0" err="1"/>
+              <a:t>exslt</a:t>
+            </a:r>
+            <a:r>
+              <a:rPr lang="en-US" dirty="0"/>
+              <a:t> extension function from exslt.org (last updated: 2003)</a:t>
+            </a:r>
+          </a:p>
+          <a:p>
+            <a:pPr marL="171450" indent="-171450">
+              <a:buFont typeface="Arial" panose="020B0604020202020204" pitchFamily="34" charset="0"/>
+              <a:buChar char="•"/>
+            </a:pPr>
+            <a:r>
+              <a:rPr lang="en-US" dirty="0" err="1"/>
+              <a:t>stx</a:t>
+            </a:r>
+            <a:r>
+              <a:rPr lang="en-US" dirty="0"/>
+              <a:t> (Streaming Transformations for XML) an XML based language for transforming XML documents without building a tree in memory (last update: 2007)</a:t>
+            </a:r>
+          </a:p>
+          <a:p>
+            <a:pPr marL="171450" indent="-171450">
+              <a:buFont typeface="Arial" panose="020B0604020202020204" pitchFamily="34" charset="0"/>
+              <a:buChar char="•"/>
+            </a:pPr>
+            <a:endParaRPr lang="en-US" dirty="0"/>
+          </a:p>
+          <a:p>
+            <a:pPr marL="0" indent="0">
+              <a:buFont typeface="Arial" panose="020B0604020202020204" pitchFamily="34" charset="0"/>
+              <a:buNone/>
+            </a:pPr>
+            <a:r>
+              <a:rPr lang="en-US" dirty="0"/>
+              <a:t>Contrary to what you might expect: not case-sensitive </a:t>
+            </a:r>
             <a:endParaRPr lang="en-NL" dirty="0"/>
           </a:p>
         </p:txBody>
@@ -1239,7 +1249,175 @@
           <a:p>
             <a:fld id="{A83FDDBB-341F-4A2D-A070-8A29B8B1C9DF}" type="slidenum">
               <a:rPr lang="en-NL" smtClean="0"/>
-              <a:t>43</a:t>
+              <a:t>37</a:t>
+            </a:fld>
+            <a:endParaRPr lang="en-NL"/>
+          </a:p>
+        </p:txBody>
+      </p:sp>
+    </p:spTree>
+    <p:extLst>
+      <p:ext uri="{BB962C8B-B14F-4D97-AF65-F5344CB8AC3E}">
+        <p14:creationId xmlns:p14="http://schemas.microsoft.com/office/powerpoint/2010/main" val="1888077813"/>
+      </p:ext>
+    </p:extLst>
+  </p:cSld>
+  <p:clrMapOvr>
+    <a:masterClrMapping/>
+  </p:clrMapOvr>
+</p:notes>
+</file>
+
+<file path=ppt/notesSlides/notesSlide14.xml><?xml version="1.0" encoding="utf-8"?>
+<p:notes xmlns:a="http://schemas.openxmlformats.org/drawingml/2006/main" xmlns:r="http://schemas.openxmlformats.org/officeDocument/2006/relationships" xmlns:p="http://schemas.openxmlformats.org/presentationml/2006/main">
+  <p:cSld>
+    <p:spTree>
+      <p:nvGrpSpPr>
+        <p:cNvPr id="1" name=""/>
+        <p:cNvGrpSpPr/>
+        <p:nvPr/>
+      </p:nvGrpSpPr>
+      <p:grpSpPr>
+        <a:xfrm>
+          <a:off x="0" y="0"/>
+          <a:ext cx="0" cy="0"/>
+          <a:chOff x="0" y="0"/>
+          <a:chExt cx="0" cy="0"/>
+        </a:xfrm>
+      </p:grpSpPr>
+      <p:sp>
+        <p:nvSpPr>
+          <p:cNvPr id="2" name="Slide Image Placeholder 1"/>
+          <p:cNvSpPr>
+            <a:spLocks noGrp="1" noRot="1" noChangeAspect="1"/>
+          </p:cNvSpPr>
+          <p:nvPr>
+            <p:ph type="sldImg"/>
+          </p:nvPr>
+        </p:nvSpPr>
+        <p:spPr/>
+      </p:sp>
+      <p:sp>
+        <p:nvSpPr>
+          <p:cNvPr id="3" name="Notes Placeholder 2"/>
+          <p:cNvSpPr>
+            <a:spLocks noGrp="1"/>
+          </p:cNvSpPr>
+          <p:nvPr>
+            <p:ph type="body" idx="1"/>
+          </p:nvPr>
+        </p:nvSpPr>
+        <p:spPr/>
+        <p:txBody>
+          <a:bodyPr/>
+          <a:lstStyle/>
+          <a:p>
+            <a:endParaRPr lang="en-NL" dirty="0"/>
+          </a:p>
+        </p:txBody>
+      </p:sp>
+      <p:sp>
+        <p:nvSpPr>
+          <p:cNvPr id="4" name="Slide Number Placeholder 3"/>
+          <p:cNvSpPr>
+            <a:spLocks noGrp="1"/>
+          </p:cNvSpPr>
+          <p:nvPr>
+            <p:ph type="sldNum" sz="quarter" idx="5"/>
+          </p:nvPr>
+        </p:nvSpPr>
+        <p:spPr/>
+        <p:txBody>
+          <a:bodyPr/>
+          <a:lstStyle/>
+          <a:p>
+            <a:fld id="{210C85D1-D769-4E3C-BD67-6FCFE11EFBEA}" type="slidenum">
+              <a:rPr lang="en-NL" smtClean="0"/>
+              <a:t>44</a:t>
+            </a:fld>
+            <a:endParaRPr lang="en-NL"/>
+          </a:p>
+        </p:txBody>
+      </p:sp>
+    </p:spTree>
+    <p:extLst>
+      <p:ext uri="{BB962C8B-B14F-4D97-AF65-F5344CB8AC3E}">
+        <p14:creationId xmlns:p14="http://schemas.microsoft.com/office/powerpoint/2010/main" val="3823199839"/>
+      </p:ext>
+    </p:extLst>
+  </p:cSld>
+  <p:clrMapOvr>
+    <a:masterClrMapping/>
+  </p:clrMapOvr>
+</p:notes>
+</file>
+
+<file path=ppt/notesSlides/notesSlide15.xml><?xml version="1.0" encoding="utf-8"?>
+<p:notes xmlns:a="http://schemas.openxmlformats.org/drawingml/2006/main" xmlns:r="http://schemas.openxmlformats.org/officeDocument/2006/relationships" xmlns:p="http://schemas.openxmlformats.org/presentationml/2006/main">
+  <p:cSld>
+    <p:spTree>
+      <p:nvGrpSpPr>
+        <p:cNvPr id="1" name=""/>
+        <p:cNvGrpSpPr/>
+        <p:nvPr/>
+      </p:nvGrpSpPr>
+      <p:grpSpPr>
+        <a:xfrm>
+          <a:off x="0" y="0"/>
+          <a:ext cx="0" cy="0"/>
+          <a:chOff x="0" y="0"/>
+          <a:chExt cx="0" cy="0"/>
+        </a:xfrm>
+      </p:grpSpPr>
+      <p:sp>
+        <p:nvSpPr>
+          <p:cNvPr id="2" name="Slide Image Placeholder 1"/>
+          <p:cNvSpPr>
+            <a:spLocks noGrp="1" noRot="1" noChangeAspect="1"/>
+          </p:cNvSpPr>
+          <p:nvPr>
+            <p:ph type="sldImg"/>
+          </p:nvPr>
+        </p:nvSpPr>
+        <p:spPr/>
+      </p:sp>
+      <p:sp>
+        <p:nvSpPr>
+          <p:cNvPr id="3" name="Notes Placeholder 2"/>
+          <p:cNvSpPr>
+            <a:spLocks noGrp="1"/>
+          </p:cNvSpPr>
+          <p:nvPr>
+            <p:ph type="body" idx="1"/>
+          </p:nvPr>
+        </p:nvSpPr>
+        <p:spPr/>
+        <p:txBody>
+          <a:bodyPr/>
+          <a:lstStyle/>
+          <a:p>
+            <a:endParaRPr lang="en-NL" dirty="0"/>
+          </a:p>
+        </p:txBody>
+      </p:sp>
+      <p:sp>
+        <p:nvSpPr>
+          <p:cNvPr id="4" name="Slide Number Placeholder 3"/>
+          <p:cNvSpPr>
+            <a:spLocks noGrp="1"/>
+          </p:cNvSpPr>
+          <p:nvPr>
+            <p:ph type="sldNum" sz="quarter" idx="5"/>
+          </p:nvPr>
+        </p:nvSpPr>
+        <p:spPr/>
+        <p:txBody>
+          <a:bodyPr/>
+          <a:lstStyle/>
+          <a:p>
+            <a:fld id="{A83FDDBB-341F-4A2D-A070-8A29B8B1C9DF}" type="slidenum">
+              <a:rPr lang="en-NL" smtClean="0"/>
+              <a:t>48</a:t>
             </a:fld>
             <a:endParaRPr lang="en-NL"/>
           </a:p>
@@ -2087,7 +2265,7 @@
           <a:p>
             <a:fld id="{9446F294-FC6D-4658-8D72-6C175CC4BEDF}" type="datetimeFigureOut">
               <a:rPr lang="en-US" smtClean="0"/>
-              <a:t>10/25/2022</a:t>
+              <a:t>11/3/2022</a:t>
             </a:fld>
             <a:endParaRPr lang="en-US"/>
           </a:p>
@@ -2311,7 +2489,7 @@
           <a:p>
             <a:fld id="{9446F294-FC6D-4658-8D72-6C175CC4BEDF}" type="datetimeFigureOut">
               <a:rPr lang="en-US" smtClean="0"/>
-              <a:t>10/25/2022</a:t>
+              <a:t>11/3/2022</a:t>
             </a:fld>
             <a:endParaRPr lang="en-US"/>
           </a:p>
@@ -2545,7 +2723,7 @@
           <a:p>
             <a:fld id="{9446F294-FC6D-4658-8D72-6C175CC4BEDF}" type="datetimeFigureOut">
               <a:rPr lang="en-US" smtClean="0"/>
-              <a:t>10/25/2022</a:t>
+              <a:t>11/3/2022</a:t>
             </a:fld>
             <a:endParaRPr lang="en-US"/>
           </a:p>
@@ -2769,7 +2947,7 @@
           <a:p>
             <a:fld id="{9446F294-FC6D-4658-8D72-6C175CC4BEDF}" type="datetimeFigureOut">
               <a:rPr lang="en-US" smtClean="0"/>
-              <a:t>10/25/2022</a:t>
+              <a:t>11/3/2022</a:t>
             </a:fld>
             <a:endParaRPr lang="en-US"/>
           </a:p>
@@ -3069,7 +3247,7 @@
           <a:p>
             <a:fld id="{9446F294-FC6D-4658-8D72-6C175CC4BEDF}" type="datetimeFigureOut">
               <a:rPr lang="en-US" smtClean="0"/>
-              <a:t>10/25/2022</a:t>
+              <a:t>11/3/2022</a:t>
             </a:fld>
             <a:endParaRPr lang="en-US"/>
           </a:p>
@@ -3361,7 +3539,7 @@
           <a:p>
             <a:fld id="{9446F294-FC6D-4658-8D72-6C175CC4BEDF}" type="datetimeFigureOut">
               <a:rPr lang="en-US" smtClean="0"/>
-              <a:t>10/25/2022</a:t>
+              <a:t>11/3/2022</a:t>
             </a:fld>
             <a:endParaRPr lang="en-US"/>
           </a:p>
@@ -3800,7 +3978,7 @@
           <a:p>
             <a:fld id="{9446F294-FC6D-4658-8D72-6C175CC4BEDF}" type="datetimeFigureOut">
               <a:rPr lang="en-US" smtClean="0"/>
-              <a:t>10/25/2022</a:t>
+              <a:t>11/3/2022</a:t>
             </a:fld>
             <a:endParaRPr lang="en-US"/>
           </a:p>
@@ -3966,7 +4144,7 @@
           <a:p>
             <a:fld id="{9446F294-FC6D-4658-8D72-6C175CC4BEDF}" type="datetimeFigureOut">
               <a:rPr lang="en-US" smtClean="0"/>
-              <a:t>10/25/2022</a:t>
+              <a:t>11/3/2022</a:t>
             </a:fld>
             <a:endParaRPr lang="en-US"/>
           </a:p>
@@ -4103,7 +4281,7 @@
           <a:p>
             <a:fld id="{9446F294-FC6D-4658-8D72-6C175CC4BEDF}" type="datetimeFigureOut">
               <a:rPr lang="en-US" smtClean="0"/>
-              <a:t>10/25/2022</a:t>
+              <a:t>11/3/2022</a:t>
             </a:fld>
             <a:endParaRPr lang="en-US"/>
           </a:p>
@@ -4440,7 +4618,7 @@
           <a:p>
             <a:fld id="{9446F294-FC6D-4658-8D72-6C175CC4BEDF}" type="datetimeFigureOut">
               <a:rPr lang="en-US" smtClean="0"/>
-              <a:t>10/25/2022</a:t>
+              <a:t>11/3/2022</a:t>
             </a:fld>
             <a:endParaRPr lang="en-US"/>
           </a:p>
@@ -4753,7 +4931,7 @@
           <a:p>
             <a:fld id="{9446F294-FC6D-4658-8D72-6C175CC4BEDF}" type="datetimeFigureOut">
               <a:rPr lang="en-US" smtClean="0"/>
-              <a:t>10/25/2022</a:t>
+              <a:t>11/3/2022</a:t>
             </a:fld>
             <a:endParaRPr lang="en-US"/>
           </a:p>
@@ -6360,7 +6538,7 @@
               <a:t>reports </a:t>
             </a:r>
             <a:r>
-              <a:rPr lang="en-US" sz="2200" b="1" dirty="0">
+              <a:rPr lang="en-US" b="1" dirty="0">
                 <a:latin typeface="Courier New" panose="02070309020205020404" pitchFamily="49" charset="0"/>
                 <a:cs typeface="Courier New" panose="02070309020205020404" pitchFamily="49" charset="0"/>
               </a:rPr>
@@ -10059,19 +10237,15 @@
           <a:p>
             <a:pPr lvl="1"/>
             <a:r>
+              <a:rPr lang="en-US" sz="2200" b="1" dirty="0">
+                <a:latin typeface="Courier New" panose="02070309020205020404" pitchFamily="49" charset="0"/>
+                <a:cs typeface="Courier New" panose="02070309020205020404" pitchFamily="49" charset="0"/>
+              </a:rPr>
+              <a:t>&lt;schema&gt;</a:t>
+            </a:r>
+            <a:r>
               <a:rPr lang="en-US" dirty="0"/>
-              <a:t> </a:t>
-            </a:r>
-            <a:r>
-              <a:rPr lang="en-US" sz="2200" b="1" dirty="0">
-                <a:latin typeface="Courier New" panose="02070309020205020404" pitchFamily="49" charset="0"/>
-                <a:cs typeface="Courier New" panose="02070309020205020404" pitchFamily="49" charset="0"/>
-              </a:rPr>
-              <a:t>&lt;schema&gt;</a:t>
-            </a:r>
-            <a:r>
-              <a:rPr lang="en-US" dirty="0"/>
-              <a:t> (context item document node)</a:t>
+              <a:t> 	(context item document node)</a:t>
             </a:r>
             <a:endParaRPr lang="en-US" sz="2200" b="1" dirty="0">
               <a:latin typeface="Courier New" panose="02070309020205020404" pitchFamily="49" charset="0"/>
@@ -10089,7 +10263,7 @@
             </a:r>
             <a:r>
               <a:rPr lang="en-US" sz="2400" dirty="0"/>
-              <a:t> (context item document node)</a:t>
+              <a:t> 	(context item document node)</a:t>
             </a:r>
             <a:endParaRPr lang="en-US" sz="2200" b="1" dirty="0">
               <a:latin typeface="Courier New" panose="02070309020205020404" pitchFamily="49" charset="0"/>
@@ -10107,7 +10281,7 @@
             </a:r>
             <a:r>
               <a:rPr lang="en-US" sz="2400" dirty="0"/>
-              <a:t> (context item node matched upon)</a:t>
+              <a:t> 		(context item node matched upon)</a:t>
             </a:r>
             <a:endParaRPr lang="en-US" sz="2200" b="1" dirty="0">
               <a:latin typeface="Courier New" panose="02070309020205020404" pitchFamily="49" charset="0"/>
@@ -11775,6 +11949,122 @@
           </a:p>
         </p:txBody>
       </p:sp>
+      <p:sp>
+        <p:nvSpPr>
+          <p:cNvPr id="3" name="Title 1">
+            <a:extLst>
+              <a:ext uri="{FF2B5EF4-FFF2-40B4-BE49-F238E27FC236}">
+                <a16:creationId xmlns:a16="http://schemas.microsoft.com/office/drawing/2014/main" id="{17AAC709-DC04-CD0A-F03D-9A4BA600D327}"/>
+              </a:ext>
+            </a:extLst>
+          </p:cNvPr>
+          <p:cNvSpPr txBox="1">
+            <a:spLocks/>
+          </p:cNvSpPr>
+          <p:nvPr/>
+        </p:nvSpPr>
+        <p:spPr>
+          <a:xfrm>
+            <a:off x="5388742" y="2052869"/>
+            <a:ext cx="2192678" cy="946869"/>
+          </a:xfrm>
+          <a:prstGeom prst="rect">
+            <a:avLst/>
+          </a:prstGeom>
+          <a:solidFill>
+            <a:schemeClr val="bg1"/>
+          </a:solidFill>
+        </p:spPr>
+        <p:txBody>
+          <a:bodyPr vert="horz" lIns="91440" tIns="45720" rIns="91440" bIns="45720" rtlCol="0" anchor="ctr">
+            <a:normAutofit/>
+          </a:bodyPr>
+          <a:lstStyle>
+            <a:lvl1pPr algn="l" defTabSz="914400" rtl="0" eaLnBrk="1" latinLnBrk="0" hangingPunct="1">
+              <a:lnSpc>
+                <a:spcPct val="90000"/>
+              </a:lnSpc>
+              <a:spcBef>
+                <a:spcPct val="0"/>
+              </a:spcBef>
+              <a:buNone/>
+              <a:defRPr sz="4400" kern="1200">
+                <a:solidFill>
+                  <a:schemeClr val="tx1"/>
+                </a:solidFill>
+                <a:latin typeface="+mj-lt"/>
+                <a:ea typeface="+mj-ea"/>
+                <a:cs typeface="+mj-cs"/>
+              </a:defRPr>
+            </a:lvl1pPr>
+          </a:lstStyle>
+          <a:p>
+            <a:r>
+              <a:rPr lang="en-US" sz="5400" b="1" dirty="0"/>
+              <a:t>Phases</a:t>
+            </a:r>
+            <a:endParaRPr lang="en-NL" sz="5400" b="1" dirty="0"/>
+          </a:p>
+        </p:txBody>
+      </p:sp>
+      <p:sp>
+        <p:nvSpPr>
+          <p:cNvPr id="4" name="Title 1">
+            <a:extLst>
+              <a:ext uri="{FF2B5EF4-FFF2-40B4-BE49-F238E27FC236}">
+                <a16:creationId xmlns:a16="http://schemas.microsoft.com/office/drawing/2014/main" id="{2E5448E6-273B-CD55-2C14-AF3706687AA5}"/>
+              </a:ext>
+            </a:extLst>
+          </p:cNvPr>
+          <p:cNvSpPr txBox="1">
+            <a:spLocks/>
+          </p:cNvSpPr>
+          <p:nvPr/>
+        </p:nvSpPr>
+        <p:spPr>
+          <a:xfrm>
+            <a:off x="7219469" y="3953047"/>
+            <a:ext cx="3301917" cy="946869"/>
+          </a:xfrm>
+          <a:prstGeom prst="rect">
+            <a:avLst/>
+          </a:prstGeom>
+          <a:solidFill>
+            <a:schemeClr val="bg1"/>
+          </a:solidFill>
+        </p:spPr>
+        <p:txBody>
+          <a:bodyPr vert="horz" lIns="91440" tIns="45720" rIns="91440" bIns="45720" rtlCol="0" anchor="ctr">
+            <a:noAutofit/>
+          </a:bodyPr>
+          <a:lstStyle>
+            <a:lvl1pPr algn="l" defTabSz="914400" rtl="0" eaLnBrk="1" latinLnBrk="0" hangingPunct="1">
+              <a:lnSpc>
+                <a:spcPct val="90000"/>
+              </a:lnSpc>
+              <a:spcBef>
+                <a:spcPct val="0"/>
+              </a:spcBef>
+              <a:buNone/>
+              <a:defRPr sz="4400" kern="1200">
+                <a:solidFill>
+                  <a:schemeClr val="tx1"/>
+                </a:solidFill>
+                <a:latin typeface="+mj-lt"/>
+                <a:ea typeface="+mj-ea"/>
+                <a:cs typeface="+mj-cs"/>
+              </a:defRPr>
+            </a:lvl1pPr>
+          </a:lstStyle>
+          <a:p>
+            <a:r>
+              <a:rPr lang="en-US" sz="5400" b="1" dirty="0"/>
+              <a:t>Diagnostics</a:t>
+            </a:r>
+            <a:endParaRPr lang="en-NL" sz="5400" b="1" dirty="0"/>
+          </a:p>
+        </p:txBody>
+      </p:sp>
     </p:spTree>
     <p:extLst>
       <p:ext uri="{BB962C8B-B14F-4D97-AF65-F5344CB8AC3E}">
@@ -12868,7 +13158,7 @@
         <p:spPr>
           <a:xfrm>
             <a:off x="3623157" y="2924301"/>
-            <a:ext cx="1085936" cy="380344"/>
+            <a:ext cx="1011906" cy="380344"/>
           </a:xfrm>
           <a:prstGeom prst="ellipse">
             <a:avLst/>
@@ -12925,8 +13215,8 @@
         </p:nvSpPr>
         <p:spPr>
           <a:xfrm>
-            <a:off x="4575394" y="2924301"/>
-            <a:ext cx="1085936" cy="380344"/>
+            <a:off x="4777410" y="2924301"/>
+            <a:ext cx="883919" cy="380344"/>
           </a:xfrm>
           <a:prstGeom prst="ellipse">
             <a:avLst/>
@@ -14661,14 +14951,14 @@
         </p:nvSpPr>
         <p:spPr>
           <a:xfrm flipV="1">
-            <a:off x="7101068" y="3639642"/>
-            <a:ext cx="2675728" cy="2077178"/>
+            <a:off x="8565930" y="3429000"/>
+            <a:ext cx="1210865" cy="2287820"/>
           </a:xfrm>
           <a:prstGeom prst="bentArrow">
             <a:avLst>
               <a:gd name="adj1" fmla="val 8563"/>
-              <a:gd name="adj2" fmla="val 9197"/>
-              <a:gd name="adj3" fmla="val 28859"/>
+              <a:gd name="adj2" fmla="val 15056"/>
+              <a:gd name="adj3" fmla="val 26689"/>
               <a:gd name="adj4" fmla="val 37408"/>
             </a:avLst>
           </a:prstGeom>
@@ -14749,12 +15039,14 @@
         </p:nvSpPr>
         <p:spPr>
           <a:xfrm>
-            <a:off x="244997" y="1825625"/>
-            <a:ext cx="11702005" cy="4351338"/>
+            <a:off x="281783" y="1690688"/>
+            <a:ext cx="11702005" cy="3576692"/>
           </a:xfrm>
         </p:spPr>
         <p:txBody>
-          <a:bodyPr/>
+          <a:bodyPr>
+            <a:normAutofit/>
+          </a:bodyPr>
           <a:lstStyle/>
           <a:p>
             <a:r>
@@ -14772,13 +15064,13 @@
             <a:pPr lvl="1"/>
             <a:r>
               <a:rPr lang="en-US" dirty="0"/>
-              <a:t>Basic instructions at: </a:t>
+              <a:t>Basic instructions: </a:t>
             </a:r>
             <a:r>
               <a:rPr lang="en-US" dirty="0">
                 <a:hlinkClick r:id="rId3"/>
               </a:rPr>
-              <a:t>http://da.xatapult.com/</a:t>
+              <a:t>http://da2022.xatapul t.com/</a:t>
             </a:r>
             <a:endParaRPr lang="en-US" dirty="0"/>
           </a:p>
@@ -14786,13 +15078,13 @@
             <a:pPr lvl="1"/>
             <a:r>
               <a:rPr lang="en-US" dirty="0"/>
-              <a:t>Presentation, code and instructions are in: </a:t>
+              <a:t>Presentation, code and instructions: </a:t>
             </a:r>
             <a:r>
               <a:rPr lang="en-US" dirty="0">
                 <a:hlinkClick r:id="rId4"/>
               </a:rPr>
-              <a:t>https://github.com/xatapult/da-2021-xproc</a:t>
+              <a:t>https://github.com/xatapult/da-2022-schematron</a:t>
             </a:r>
             <a:r>
               <a:rPr lang="en-US" dirty="0"/>
@@ -14807,18 +15099,46 @@
             </a:r>
           </a:p>
           <a:p>
+            <a:pPr lvl="1"/>
+            <a:r>
+              <a:rPr lang="en-US" dirty="0"/>
+              <a:t>All exercises contain instructions in </a:t>
+            </a:r>
+            <a:r>
+              <a:rPr lang="en-US" sz="2000" b="1" dirty="0">
+                <a:latin typeface="Courier New" panose="02070309020205020404" pitchFamily="49" charset="0"/>
+                <a:cs typeface="Courier New" panose="02070309020205020404" pitchFamily="49" charset="0"/>
+              </a:rPr>
+              <a:t>instructions.pdf </a:t>
+            </a:r>
+            <a:endParaRPr lang="en-US" b="1" dirty="0">
+              <a:latin typeface="Courier New" panose="02070309020205020404" pitchFamily="49" charset="0"/>
+              <a:cs typeface="Courier New" panose="02070309020205020404" pitchFamily="49" charset="0"/>
+            </a:endParaRPr>
+          </a:p>
+          <a:p>
+            <a:pPr lvl="1"/>
+            <a:r>
+              <a:rPr lang="en-US" dirty="0"/>
+              <a:t>Solution and explanations in </a:t>
+            </a:r>
+            <a:r>
+              <a:rPr lang="en-US" sz="2000" b="1" dirty="0">
+                <a:latin typeface="Courier New" panose="02070309020205020404" pitchFamily="49" charset="0"/>
+                <a:cs typeface="Courier New" panose="02070309020205020404" pitchFamily="49" charset="0"/>
+              </a:rPr>
+              <a:t>solution/</a:t>
+            </a:r>
+            <a:r>
+              <a:rPr lang="en-US" dirty="0"/>
+              <a:t> subfolder</a:t>
+            </a:r>
+          </a:p>
+          <a:p>
             <a:r>
               <a:rPr lang="en-US" dirty="0"/>
               <a:t>Repeat</a:t>
             </a:r>
-          </a:p>
-          <a:p>
-            <a:pPr lvl="1"/>
-            <a:endParaRPr lang="en-US" dirty="0"/>
-          </a:p>
-          <a:p>
-            <a:pPr lvl="1"/>
-            <a:endParaRPr lang="en-NL" dirty="0"/>
           </a:p>
         </p:txBody>
       </p:sp>
@@ -14867,7 +15187,7 @@
         <p:spPr>
           <a:xfrm>
             <a:off x="5646470" y="1141179"/>
-            <a:ext cx="3347060" cy="1642531"/>
+            <a:ext cx="3347060" cy="1472907"/>
           </a:xfrm>
           <a:prstGeom prst="bentArrow">
             <a:avLst>
@@ -14903,6 +15223,52 @@
               <a:solidFill>
                 <a:schemeClr val="tx1"/>
               </a:solidFill>
+            </a:endParaRPr>
+          </a:p>
+        </p:txBody>
+      </p:sp>
+      <p:sp>
+        <p:nvSpPr>
+          <p:cNvPr id="4" name="TextBox 3">
+            <a:extLst>
+              <a:ext uri="{FF2B5EF4-FFF2-40B4-BE49-F238E27FC236}">
+                <a16:creationId xmlns:a16="http://schemas.microsoft.com/office/drawing/2014/main" id="{7870C712-B235-0C17-5FD7-59DFBF1963FA}"/>
+              </a:ext>
+            </a:extLst>
+          </p:cNvPr>
+          <p:cNvSpPr txBox="1"/>
+          <p:nvPr/>
+        </p:nvSpPr>
+        <p:spPr>
+          <a:xfrm>
+            <a:off x="627992" y="5616834"/>
+            <a:ext cx="8615855" cy="400110"/>
+          </a:xfrm>
+          <a:prstGeom prst="rect">
+            <a:avLst/>
+          </a:prstGeom>
+          <a:noFill/>
+        </p:spPr>
+        <p:txBody>
+          <a:bodyPr wrap="square" rtlCol="0">
+            <a:spAutoFit/>
+          </a:bodyPr>
+          <a:lstStyle/>
+          <a:p>
+            <a:r>
+              <a:rPr lang="en-US" sz="2000" dirty="0"/>
+              <a:t>All instructions and explanations are collected in </a:t>
+            </a:r>
+            <a:r>
+              <a:rPr lang="en-US" b="1" dirty="0">
+                <a:latin typeface="Courier New" panose="02070309020205020404" pitchFamily="49" charset="0"/>
+                <a:cs typeface="Courier New" panose="02070309020205020404" pitchFamily="49" charset="0"/>
+              </a:rPr>
+              <a:t>exercises/syllabus.pdf</a:t>
+            </a:r>
+            <a:endParaRPr lang="en-NL" sz="2000" b="1" dirty="0">
+              <a:latin typeface="Courier New" panose="02070309020205020404" pitchFamily="49" charset="0"/>
+              <a:cs typeface="Courier New" panose="02070309020205020404" pitchFamily="49" charset="0"/>
             </a:endParaRPr>
           </a:p>
         </p:txBody>
@@ -14937,6 +15303,1907 @@
           <a:chExt cx="0" cy="0"/>
         </a:xfrm>
       </p:grpSpPr>
+      <p:sp>
+        <p:nvSpPr>
+          <p:cNvPr id="2" name="Title 1">
+            <a:extLst>
+              <a:ext uri="{FF2B5EF4-FFF2-40B4-BE49-F238E27FC236}">
+                <a16:creationId xmlns:a16="http://schemas.microsoft.com/office/drawing/2014/main" id="{143F979C-CA86-AE0D-1B71-C61F31ADE85A}"/>
+              </a:ext>
+            </a:extLst>
+          </p:cNvPr>
+          <p:cNvSpPr>
+            <a:spLocks noGrp="1"/>
+          </p:cNvSpPr>
+          <p:nvPr>
+            <p:ph type="title"/>
+          </p:nvPr>
+        </p:nvSpPr>
+        <p:spPr>
+          <a:xfrm>
+            <a:off x="396765" y="80552"/>
+            <a:ext cx="10515600" cy="1082922"/>
+          </a:xfrm>
+        </p:spPr>
+        <p:txBody>
+          <a:bodyPr/>
+          <a:lstStyle/>
+          <a:p>
+            <a:r>
+              <a:rPr lang="en-US" b="1" dirty="0"/>
+              <a:t>Selecting active patterns: phases</a:t>
+            </a:r>
+            <a:endParaRPr lang="en-NL" b="1" dirty="0"/>
+          </a:p>
+        </p:txBody>
+      </p:sp>
+      <p:sp>
+        <p:nvSpPr>
+          <p:cNvPr id="4" name="TextBox 3">
+            <a:extLst>
+              <a:ext uri="{FF2B5EF4-FFF2-40B4-BE49-F238E27FC236}">
+                <a16:creationId xmlns:a16="http://schemas.microsoft.com/office/drawing/2014/main" id="{0B792318-938D-97E5-71E9-48F246A27C07}"/>
+              </a:ext>
+            </a:extLst>
+          </p:cNvPr>
+          <p:cNvSpPr txBox="1"/>
+          <p:nvPr/>
+        </p:nvSpPr>
+        <p:spPr>
+          <a:xfrm>
+            <a:off x="703794" y="1361882"/>
+            <a:ext cx="9406694" cy="4524315"/>
+          </a:xfrm>
+          <a:prstGeom prst="rect">
+            <a:avLst/>
+          </a:prstGeom>
+          <a:solidFill>
+            <a:schemeClr val="bg1">
+              <a:lumMod val="95000"/>
+            </a:schemeClr>
+          </a:solidFill>
+        </p:spPr>
+        <p:txBody>
+          <a:bodyPr wrap="square" rtlCol="0">
+            <a:spAutoFit/>
+          </a:bodyPr>
+          <a:lstStyle/>
+          <a:p>
+            <a:r>
+              <a:rPr lang="de-DE" sz="2400" b="1" dirty="0">
+                <a:latin typeface="Courier New" panose="02070309020205020404" pitchFamily="49" charset="0"/>
+                <a:cs typeface="Courier New" panose="02070309020205020404" pitchFamily="49" charset="0"/>
+              </a:rPr>
+              <a:t>&lt;</a:t>
+            </a:r>
+            <a:r>
+              <a:rPr lang="de-DE" sz="2400" b="1" dirty="0" err="1">
+                <a:latin typeface="Courier New" panose="02070309020205020404" pitchFamily="49" charset="0"/>
+                <a:cs typeface="Courier New" panose="02070309020205020404" pitchFamily="49" charset="0"/>
+              </a:rPr>
+              <a:t>phase</a:t>
+            </a:r>
+            <a:r>
+              <a:rPr lang="de-DE" sz="2400" b="1" dirty="0">
+                <a:latin typeface="Courier New" panose="02070309020205020404" pitchFamily="49" charset="0"/>
+                <a:cs typeface="Courier New" panose="02070309020205020404" pitchFamily="49" charset="0"/>
+              </a:rPr>
+              <a:t> </a:t>
+            </a:r>
+            <a:r>
+              <a:rPr lang="de-DE" sz="2400" b="1" dirty="0" err="1">
+                <a:latin typeface="Courier New" panose="02070309020205020404" pitchFamily="49" charset="0"/>
+                <a:cs typeface="Courier New" panose="02070309020205020404" pitchFamily="49" charset="0"/>
+              </a:rPr>
+              <a:t>id</a:t>
+            </a:r>
+            <a:r>
+              <a:rPr lang="de-DE" sz="2400" b="1" dirty="0">
+                <a:latin typeface="Courier New" panose="02070309020205020404" pitchFamily="49" charset="0"/>
+                <a:cs typeface="Courier New" panose="02070309020205020404" pitchFamily="49" charset="0"/>
+              </a:rPr>
+              <a:t>="normal-</a:t>
+            </a:r>
+            <a:r>
+              <a:rPr lang="de-DE" sz="2400" b="1" dirty="0" err="1">
+                <a:latin typeface="Courier New" panose="02070309020205020404" pitchFamily="49" charset="0"/>
+                <a:cs typeface="Courier New" panose="02070309020205020404" pitchFamily="49" charset="0"/>
+              </a:rPr>
+              <a:t>only</a:t>
+            </a:r>
+            <a:r>
+              <a:rPr lang="de-DE" sz="2400" b="1" dirty="0">
+                <a:latin typeface="Courier New" panose="02070309020205020404" pitchFamily="49" charset="0"/>
+                <a:cs typeface="Courier New" panose="02070309020205020404" pitchFamily="49" charset="0"/>
+              </a:rPr>
+              <a:t>"&gt;</a:t>
+            </a:r>
+          </a:p>
+          <a:p>
+            <a:r>
+              <a:rPr lang="de-DE" sz="2400" b="1" dirty="0">
+                <a:latin typeface="Courier New" panose="02070309020205020404" pitchFamily="49" charset="0"/>
+                <a:cs typeface="Courier New" panose="02070309020205020404" pitchFamily="49" charset="0"/>
+              </a:rPr>
+              <a:t>  &lt;</a:t>
+            </a:r>
+            <a:r>
+              <a:rPr lang="de-DE" sz="2400" b="1" dirty="0" err="1">
+                <a:latin typeface="Courier New" panose="02070309020205020404" pitchFamily="49" charset="0"/>
+                <a:cs typeface="Courier New" panose="02070309020205020404" pitchFamily="49" charset="0"/>
+              </a:rPr>
+              <a:t>active</a:t>
+            </a:r>
+            <a:r>
+              <a:rPr lang="de-DE" sz="2400" b="1" dirty="0">
+                <a:latin typeface="Courier New" panose="02070309020205020404" pitchFamily="49" charset="0"/>
+                <a:cs typeface="Courier New" panose="02070309020205020404" pitchFamily="49" charset="0"/>
+              </a:rPr>
+              <a:t> </a:t>
+            </a:r>
+            <a:r>
+              <a:rPr lang="de-DE" sz="2400" b="1" dirty="0" err="1">
+                <a:latin typeface="Courier New" panose="02070309020205020404" pitchFamily="49" charset="0"/>
+                <a:cs typeface="Courier New" panose="02070309020205020404" pitchFamily="49" charset="0"/>
+              </a:rPr>
+              <a:t>pattern</a:t>
+            </a:r>
+            <a:r>
+              <a:rPr lang="de-DE" sz="2400" b="1" dirty="0">
+                <a:latin typeface="Courier New" panose="02070309020205020404" pitchFamily="49" charset="0"/>
+                <a:cs typeface="Courier New" panose="02070309020205020404" pitchFamily="49" charset="0"/>
+              </a:rPr>
+              <a:t>="normal-</a:t>
+            </a:r>
+            <a:r>
+              <a:rPr lang="de-DE" sz="2400" b="1" dirty="0" err="1">
+                <a:latin typeface="Courier New" panose="02070309020205020404" pitchFamily="49" charset="0"/>
+                <a:cs typeface="Courier New" panose="02070309020205020404" pitchFamily="49" charset="0"/>
+              </a:rPr>
+              <a:t>rules</a:t>
+            </a:r>
+            <a:r>
+              <a:rPr lang="de-DE" sz="2400" b="1" dirty="0">
+                <a:latin typeface="Courier New" panose="02070309020205020404" pitchFamily="49" charset="0"/>
+                <a:cs typeface="Courier New" panose="02070309020205020404" pitchFamily="49" charset="0"/>
+              </a:rPr>
+              <a:t>"/&gt;</a:t>
+            </a:r>
+          </a:p>
+          <a:p>
+            <a:r>
+              <a:rPr lang="de-DE" sz="2400" b="1" dirty="0">
+                <a:latin typeface="Courier New" panose="02070309020205020404" pitchFamily="49" charset="0"/>
+                <a:cs typeface="Courier New" panose="02070309020205020404" pitchFamily="49" charset="0"/>
+              </a:rPr>
+              <a:t>&lt;/</a:t>
+            </a:r>
+            <a:r>
+              <a:rPr lang="de-DE" sz="2400" b="1" dirty="0" err="1">
+                <a:latin typeface="Courier New" panose="02070309020205020404" pitchFamily="49" charset="0"/>
+                <a:cs typeface="Courier New" panose="02070309020205020404" pitchFamily="49" charset="0"/>
+              </a:rPr>
+              <a:t>phase</a:t>
+            </a:r>
+            <a:r>
+              <a:rPr lang="de-DE" sz="2400" b="1" dirty="0">
+                <a:latin typeface="Courier New" panose="02070309020205020404" pitchFamily="49" charset="0"/>
+                <a:cs typeface="Courier New" panose="02070309020205020404" pitchFamily="49" charset="0"/>
+              </a:rPr>
+              <a:t>&gt;</a:t>
+            </a:r>
+          </a:p>
+          <a:p>
+            <a:endParaRPr lang="de-DE" sz="2400" b="1" dirty="0">
+              <a:latin typeface="Courier New" panose="02070309020205020404" pitchFamily="49" charset="0"/>
+              <a:cs typeface="Courier New" panose="02070309020205020404" pitchFamily="49" charset="0"/>
+            </a:endParaRPr>
+          </a:p>
+          <a:p>
+            <a:r>
+              <a:rPr lang="de-DE" sz="2400" b="1" dirty="0">
+                <a:latin typeface="Courier New" panose="02070309020205020404" pitchFamily="49" charset="0"/>
+                <a:cs typeface="Courier New" panose="02070309020205020404" pitchFamily="49" charset="0"/>
+              </a:rPr>
+              <a:t>&lt;</a:t>
+            </a:r>
+            <a:r>
+              <a:rPr lang="de-DE" sz="2400" b="1" dirty="0" err="1">
+                <a:latin typeface="Courier New" panose="02070309020205020404" pitchFamily="49" charset="0"/>
+                <a:cs typeface="Courier New" panose="02070309020205020404" pitchFamily="49" charset="0"/>
+              </a:rPr>
+              <a:t>phase</a:t>
+            </a:r>
+            <a:r>
+              <a:rPr lang="de-DE" sz="2400" b="1" dirty="0">
+                <a:latin typeface="Courier New" panose="02070309020205020404" pitchFamily="49" charset="0"/>
+                <a:cs typeface="Courier New" panose="02070309020205020404" pitchFamily="49" charset="0"/>
+              </a:rPr>
+              <a:t> </a:t>
+            </a:r>
+            <a:r>
+              <a:rPr lang="de-DE" sz="2400" b="1" dirty="0" err="1">
+                <a:latin typeface="Courier New" panose="02070309020205020404" pitchFamily="49" charset="0"/>
+                <a:cs typeface="Courier New" panose="02070309020205020404" pitchFamily="49" charset="0"/>
+              </a:rPr>
+              <a:t>id</a:t>
+            </a:r>
+            <a:r>
+              <a:rPr lang="de-DE" sz="2400" b="1" dirty="0">
+                <a:latin typeface="Courier New" panose="02070309020205020404" pitchFamily="49" charset="0"/>
+                <a:cs typeface="Courier New" panose="02070309020205020404" pitchFamily="49" charset="0"/>
+              </a:rPr>
+              <a:t>="normal-and-special"&gt;</a:t>
+            </a:r>
+          </a:p>
+          <a:p>
+            <a:r>
+              <a:rPr lang="de-DE" sz="2400" b="1" dirty="0">
+                <a:latin typeface="Courier New" panose="02070309020205020404" pitchFamily="49" charset="0"/>
+                <a:cs typeface="Courier New" panose="02070309020205020404" pitchFamily="49" charset="0"/>
+              </a:rPr>
+              <a:t>  &lt;</a:t>
+            </a:r>
+            <a:r>
+              <a:rPr lang="de-DE" sz="2400" b="1" dirty="0" err="1">
+                <a:latin typeface="Courier New" panose="02070309020205020404" pitchFamily="49" charset="0"/>
+                <a:cs typeface="Courier New" panose="02070309020205020404" pitchFamily="49" charset="0"/>
+              </a:rPr>
+              <a:t>active</a:t>
+            </a:r>
+            <a:r>
+              <a:rPr lang="de-DE" sz="2400" b="1" dirty="0">
+                <a:latin typeface="Courier New" panose="02070309020205020404" pitchFamily="49" charset="0"/>
+                <a:cs typeface="Courier New" panose="02070309020205020404" pitchFamily="49" charset="0"/>
+              </a:rPr>
+              <a:t> </a:t>
+            </a:r>
+            <a:r>
+              <a:rPr lang="de-DE" sz="2400" b="1" dirty="0" err="1">
+                <a:latin typeface="Courier New" panose="02070309020205020404" pitchFamily="49" charset="0"/>
+                <a:cs typeface="Courier New" panose="02070309020205020404" pitchFamily="49" charset="0"/>
+              </a:rPr>
+              <a:t>pattern</a:t>
+            </a:r>
+            <a:r>
+              <a:rPr lang="de-DE" sz="2400" b="1" dirty="0">
+                <a:latin typeface="Courier New" panose="02070309020205020404" pitchFamily="49" charset="0"/>
+                <a:cs typeface="Courier New" panose="02070309020205020404" pitchFamily="49" charset="0"/>
+              </a:rPr>
+              <a:t>="normal-</a:t>
+            </a:r>
+            <a:r>
+              <a:rPr lang="de-DE" sz="2400" b="1" dirty="0" err="1">
+                <a:latin typeface="Courier New" panose="02070309020205020404" pitchFamily="49" charset="0"/>
+                <a:cs typeface="Courier New" panose="02070309020205020404" pitchFamily="49" charset="0"/>
+              </a:rPr>
+              <a:t>rules</a:t>
+            </a:r>
+            <a:r>
+              <a:rPr lang="de-DE" sz="2400" b="1" dirty="0">
+                <a:latin typeface="Courier New" panose="02070309020205020404" pitchFamily="49" charset="0"/>
+                <a:cs typeface="Courier New" panose="02070309020205020404" pitchFamily="49" charset="0"/>
+              </a:rPr>
+              <a:t>"/&gt;</a:t>
+            </a:r>
+          </a:p>
+          <a:p>
+            <a:r>
+              <a:rPr lang="de-DE" sz="2400" b="1" dirty="0">
+                <a:latin typeface="Courier New" panose="02070309020205020404" pitchFamily="49" charset="0"/>
+                <a:cs typeface="Courier New" panose="02070309020205020404" pitchFamily="49" charset="0"/>
+              </a:rPr>
+              <a:t>  &lt;</a:t>
+            </a:r>
+            <a:r>
+              <a:rPr lang="de-DE" sz="2400" b="1" dirty="0" err="1">
+                <a:latin typeface="Courier New" panose="02070309020205020404" pitchFamily="49" charset="0"/>
+                <a:cs typeface="Courier New" panose="02070309020205020404" pitchFamily="49" charset="0"/>
+              </a:rPr>
+              <a:t>active</a:t>
+            </a:r>
+            <a:r>
+              <a:rPr lang="de-DE" sz="2400" b="1" dirty="0">
+                <a:latin typeface="Courier New" panose="02070309020205020404" pitchFamily="49" charset="0"/>
+                <a:cs typeface="Courier New" panose="02070309020205020404" pitchFamily="49" charset="0"/>
+              </a:rPr>
+              <a:t> </a:t>
+            </a:r>
+            <a:r>
+              <a:rPr lang="de-DE" sz="2400" b="1" dirty="0" err="1">
+                <a:latin typeface="Courier New" panose="02070309020205020404" pitchFamily="49" charset="0"/>
+                <a:cs typeface="Courier New" panose="02070309020205020404" pitchFamily="49" charset="0"/>
+              </a:rPr>
+              <a:t>pattern</a:t>
+            </a:r>
+            <a:r>
+              <a:rPr lang="de-DE" sz="2400" b="1" dirty="0">
+                <a:latin typeface="Courier New" panose="02070309020205020404" pitchFamily="49" charset="0"/>
+                <a:cs typeface="Courier New" panose="02070309020205020404" pitchFamily="49" charset="0"/>
+              </a:rPr>
+              <a:t>="special-</a:t>
+            </a:r>
+            <a:r>
+              <a:rPr lang="de-DE" sz="2400" b="1" dirty="0" err="1">
+                <a:latin typeface="Courier New" panose="02070309020205020404" pitchFamily="49" charset="0"/>
+                <a:cs typeface="Courier New" panose="02070309020205020404" pitchFamily="49" charset="0"/>
+              </a:rPr>
+              <a:t>rules</a:t>
+            </a:r>
+            <a:r>
+              <a:rPr lang="de-DE" sz="2400" b="1" dirty="0">
+                <a:latin typeface="Courier New" panose="02070309020205020404" pitchFamily="49" charset="0"/>
+                <a:cs typeface="Courier New" panose="02070309020205020404" pitchFamily="49" charset="0"/>
+              </a:rPr>
+              <a:t>"/&gt;</a:t>
+            </a:r>
+          </a:p>
+          <a:p>
+            <a:r>
+              <a:rPr lang="de-DE" sz="2400" b="1" dirty="0">
+                <a:latin typeface="Courier New" panose="02070309020205020404" pitchFamily="49" charset="0"/>
+                <a:cs typeface="Courier New" panose="02070309020205020404" pitchFamily="49" charset="0"/>
+              </a:rPr>
+              <a:t>&lt;/</a:t>
+            </a:r>
+            <a:r>
+              <a:rPr lang="de-DE" sz="2400" b="1" dirty="0" err="1">
+                <a:latin typeface="Courier New" panose="02070309020205020404" pitchFamily="49" charset="0"/>
+                <a:cs typeface="Courier New" panose="02070309020205020404" pitchFamily="49" charset="0"/>
+              </a:rPr>
+              <a:t>phase</a:t>
+            </a:r>
+            <a:r>
+              <a:rPr lang="de-DE" sz="2400" b="1" dirty="0">
+                <a:latin typeface="Courier New" panose="02070309020205020404" pitchFamily="49" charset="0"/>
+                <a:cs typeface="Courier New" panose="02070309020205020404" pitchFamily="49" charset="0"/>
+              </a:rPr>
+              <a:t>&gt;</a:t>
+            </a:r>
+          </a:p>
+          <a:p>
+            <a:endParaRPr lang="de-DE" sz="2400" b="1" dirty="0">
+              <a:latin typeface="Courier New" panose="02070309020205020404" pitchFamily="49" charset="0"/>
+              <a:cs typeface="Courier New" panose="02070309020205020404" pitchFamily="49" charset="0"/>
+            </a:endParaRPr>
+          </a:p>
+          <a:p>
+            <a:r>
+              <a:rPr lang="de-DE" sz="2400" b="1" dirty="0">
+                <a:latin typeface="Courier New" panose="02070309020205020404" pitchFamily="49" charset="0"/>
+                <a:cs typeface="Courier New" panose="02070309020205020404" pitchFamily="49" charset="0"/>
+              </a:rPr>
+              <a:t>&lt;</a:t>
+            </a:r>
+            <a:r>
+              <a:rPr lang="de-DE" sz="2400" b="1" dirty="0" err="1">
+                <a:latin typeface="Courier New" panose="02070309020205020404" pitchFamily="49" charset="0"/>
+                <a:cs typeface="Courier New" panose="02070309020205020404" pitchFamily="49" charset="0"/>
+              </a:rPr>
+              <a:t>pattern</a:t>
+            </a:r>
+            <a:r>
+              <a:rPr lang="de-DE" sz="2400" b="1" dirty="0">
+                <a:latin typeface="Courier New" panose="02070309020205020404" pitchFamily="49" charset="0"/>
+                <a:cs typeface="Courier New" panose="02070309020205020404" pitchFamily="49" charset="0"/>
+              </a:rPr>
+              <a:t> </a:t>
+            </a:r>
+            <a:r>
+              <a:rPr lang="de-DE" sz="2400" b="1" dirty="0" err="1">
+                <a:latin typeface="Courier New" panose="02070309020205020404" pitchFamily="49" charset="0"/>
+                <a:cs typeface="Courier New" panose="02070309020205020404" pitchFamily="49" charset="0"/>
+              </a:rPr>
+              <a:t>id</a:t>
+            </a:r>
+            <a:r>
+              <a:rPr lang="de-DE" sz="2400" b="1" dirty="0">
+                <a:latin typeface="Courier New" panose="02070309020205020404" pitchFamily="49" charset="0"/>
+                <a:cs typeface="Courier New" panose="02070309020205020404" pitchFamily="49" charset="0"/>
+              </a:rPr>
+              <a:t>="normal-</a:t>
+            </a:r>
+            <a:r>
+              <a:rPr lang="de-DE" sz="2400" b="1" dirty="0" err="1">
+                <a:latin typeface="Courier New" panose="02070309020205020404" pitchFamily="49" charset="0"/>
+                <a:cs typeface="Courier New" panose="02070309020205020404" pitchFamily="49" charset="0"/>
+              </a:rPr>
+              <a:t>rules</a:t>
+            </a:r>
+            <a:r>
+              <a:rPr lang="de-DE" sz="2400" b="1" dirty="0">
+                <a:latin typeface="Courier New" panose="02070309020205020404" pitchFamily="49" charset="0"/>
+                <a:cs typeface="Courier New" panose="02070309020205020404" pitchFamily="49" charset="0"/>
+              </a:rPr>
+              <a:t>"&gt;…&lt;/</a:t>
+            </a:r>
+            <a:r>
+              <a:rPr lang="de-DE" sz="2400" b="1" dirty="0" err="1">
+                <a:latin typeface="Courier New" panose="02070309020205020404" pitchFamily="49" charset="0"/>
+                <a:cs typeface="Courier New" panose="02070309020205020404" pitchFamily="49" charset="0"/>
+              </a:rPr>
+              <a:t>pattern</a:t>
+            </a:r>
+            <a:r>
+              <a:rPr lang="de-DE" sz="2400" b="1" dirty="0">
+                <a:latin typeface="Courier New" panose="02070309020205020404" pitchFamily="49" charset="0"/>
+                <a:cs typeface="Courier New" panose="02070309020205020404" pitchFamily="49" charset="0"/>
+              </a:rPr>
+              <a:t>&gt;</a:t>
+            </a:r>
+          </a:p>
+          <a:p>
+            <a:r>
+              <a:rPr lang="de-DE" sz="2400" b="1" dirty="0">
+                <a:latin typeface="Courier New" panose="02070309020205020404" pitchFamily="49" charset="0"/>
+                <a:cs typeface="Courier New" panose="02070309020205020404" pitchFamily="49" charset="0"/>
+              </a:rPr>
+              <a:t>&lt;</a:t>
+            </a:r>
+            <a:r>
+              <a:rPr lang="de-DE" sz="2400" b="1" dirty="0" err="1">
+                <a:latin typeface="Courier New" panose="02070309020205020404" pitchFamily="49" charset="0"/>
+                <a:cs typeface="Courier New" panose="02070309020205020404" pitchFamily="49" charset="0"/>
+              </a:rPr>
+              <a:t>pattern</a:t>
+            </a:r>
+            <a:r>
+              <a:rPr lang="de-DE" sz="2400" b="1" dirty="0">
+                <a:latin typeface="Courier New" panose="02070309020205020404" pitchFamily="49" charset="0"/>
+                <a:cs typeface="Courier New" panose="02070309020205020404" pitchFamily="49" charset="0"/>
+              </a:rPr>
+              <a:t> </a:t>
+            </a:r>
+            <a:r>
+              <a:rPr lang="de-DE" sz="2400" b="1" dirty="0" err="1">
+                <a:latin typeface="Courier New" panose="02070309020205020404" pitchFamily="49" charset="0"/>
+                <a:cs typeface="Courier New" panose="02070309020205020404" pitchFamily="49" charset="0"/>
+              </a:rPr>
+              <a:t>id</a:t>
+            </a:r>
+            <a:r>
+              <a:rPr lang="de-DE" sz="2400" b="1" dirty="0">
+                <a:latin typeface="Courier New" panose="02070309020205020404" pitchFamily="49" charset="0"/>
+                <a:cs typeface="Courier New" panose="02070309020205020404" pitchFamily="49" charset="0"/>
+              </a:rPr>
+              <a:t>="special-</a:t>
+            </a:r>
+            <a:r>
+              <a:rPr lang="de-DE" sz="2400" b="1" dirty="0" err="1">
+                <a:latin typeface="Courier New" panose="02070309020205020404" pitchFamily="49" charset="0"/>
+                <a:cs typeface="Courier New" panose="02070309020205020404" pitchFamily="49" charset="0"/>
+              </a:rPr>
+              <a:t>rules</a:t>
+            </a:r>
+            <a:r>
+              <a:rPr lang="de-DE" sz="2400" b="1" dirty="0">
+                <a:latin typeface="Courier New" panose="02070309020205020404" pitchFamily="49" charset="0"/>
+                <a:cs typeface="Courier New" panose="02070309020205020404" pitchFamily="49" charset="0"/>
+              </a:rPr>
+              <a:t>"&gt;…&lt;/</a:t>
+            </a:r>
+            <a:r>
+              <a:rPr lang="de-DE" sz="2400" b="1" dirty="0" err="1">
+                <a:latin typeface="Courier New" panose="02070309020205020404" pitchFamily="49" charset="0"/>
+                <a:cs typeface="Courier New" panose="02070309020205020404" pitchFamily="49" charset="0"/>
+              </a:rPr>
+              <a:t>pattern</a:t>
+            </a:r>
+            <a:r>
+              <a:rPr lang="de-DE" sz="2400" b="1" dirty="0">
+                <a:latin typeface="Courier New" panose="02070309020205020404" pitchFamily="49" charset="0"/>
+                <a:cs typeface="Courier New" panose="02070309020205020404" pitchFamily="49" charset="0"/>
+              </a:rPr>
+              <a:t>&gt;</a:t>
+            </a:r>
+          </a:p>
+          <a:p>
+            <a:r>
+              <a:rPr lang="de-DE" sz="2400" b="1" dirty="0">
+                <a:latin typeface="Courier New" panose="02070309020205020404" pitchFamily="49" charset="0"/>
+                <a:cs typeface="Courier New" panose="02070309020205020404" pitchFamily="49" charset="0"/>
+              </a:rPr>
+              <a:t>&lt;</a:t>
+            </a:r>
+            <a:r>
+              <a:rPr lang="de-DE" sz="2400" b="1" dirty="0" err="1">
+                <a:latin typeface="Courier New" panose="02070309020205020404" pitchFamily="49" charset="0"/>
+                <a:cs typeface="Courier New" panose="02070309020205020404" pitchFamily="49" charset="0"/>
+              </a:rPr>
+              <a:t>pattern</a:t>
+            </a:r>
+            <a:r>
+              <a:rPr lang="de-DE" sz="2400" b="1" dirty="0">
+                <a:latin typeface="Courier New" panose="02070309020205020404" pitchFamily="49" charset="0"/>
+                <a:cs typeface="Courier New" panose="02070309020205020404" pitchFamily="49" charset="0"/>
+              </a:rPr>
+              <a:t> </a:t>
+            </a:r>
+            <a:r>
+              <a:rPr lang="de-DE" sz="2400" b="1" dirty="0" err="1">
+                <a:latin typeface="Courier New" panose="02070309020205020404" pitchFamily="49" charset="0"/>
+                <a:cs typeface="Courier New" panose="02070309020205020404" pitchFamily="49" charset="0"/>
+              </a:rPr>
+              <a:t>id</a:t>
+            </a:r>
+            <a:r>
+              <a:rPr lang="de-DE" sz="2400" b="1" dirty="0">
+                <a:latin typeface="Courier New" panose="02070309020205020404" pitchFamily="49" charset="0"/>
+                <a:cs typeface="Courier New" panose="02070309020205020404" pitchFamily="49" charset="0"/>
+              </a:rPr>
+              <a:t>="</a:t>
+            </a:r>
+            <a:r>
+              <a:rPr lang="de-DE" sz="2400" b="1" dirty="0" err="1">
+                <a:latin typeface="Courier New" panose="02070309020205020404" pitchFamily="49" charset="0"/>
+                <a:cs typeface="Courier New" panose="02070309020205020404" pitchFamily="49" charset="0"/>
+              </a:rPr>
+              <a:t>very</a:t>
+            </a:r>
+            <a:r>
+              <a:rPr lang="de-DE" sz="2400" b="1" dirty="0">
+                <a:latin typeface="Courier New" panose="02070309020205020404" pitchFamily="49" charset="0"/>
+                <a:cs typeface="Courier New" panose="02070309020205020404" pitchFamily="49" charset="0"/>
+              </a:rPr>
+              <a:t>-special-</a:t>
+            </a:r>
+            <a:r>
+              <a:rPr lang="de-DE" sz="2400" b="1" dirty="0" err="1">
+                <a:latin typeface="Courier New" panose="02070309020205020404" pitchFamily="49" charset="0"/>
+                <a:cs typeface="Courier New" panose="02070309020205020404" pitchFamily="49" charset="0"/>
+              </a:rPr>
+              <a:t>rules</a:t>
+            </a:r>
+            <a:r>
+              <a:rPr lang="de-DE" sz="2400" b="1" dirty="0">
+                <a:latin typeface="Courier New" panose="02070309020205020404" pitchFamily="49" charset="0"/>
+                <a:cs typeface="Courier New" panose="02070309020205020404" pitchFamily="49" charset="0"/>
+              </a:rPr>
+              <a:t>"&gt;…&lt;/</a:t>
+            </a:r>
+            <a:r>
+              <a:rPr lang="de-DE" sz="2400" b="1" dirty="0" err="1">
+                <a:latin typeface="Courier New" panose="02070309020205020404" pitchFamily="49" charset="0"/>
+                <a:cs typeface="Courier New" panose="02070309020205020404" pitchFamily="49" charset="0"/>
+              </a:rPr>
+              <a:t>pattern</a:t>
+            </a:r>
+            <a:r>
+              <a:rPr lang="de-DE" sz="2400" b="1" dirty="0">
+                <a:latin typeface="Courier New" panose="02070309020205020404" pitchFamily="49" charset="0"/>
+                <a:cs typeface="Courier New" panose="02070309020205020404" pitchFamily="49" charset="0"/>
+              </a:rPr>
+              <a:t>&gt;</a:t>
+            </a:r>
+          </a:p>
+        </p:txBody>
+      </p:sp>
+    </p:spTree>
+    <p:extLst>
+      <p:ext uri="{BB962C8B-B14F-4D97-AF65-F5344CB8AC3E}">
+        <p14:creationId xmlns:p14="http://schemas.microsoft.com/office/powerpoint/2010/main" val="3396282915"/>
+      </p:ext>
+    </p:extLst>
+  </p:cSld>
+  <p:clrMapOvr>
+    <a:masterClrMapping/>
+  </p:clrMapOvr>
+</p:sld>
+</file>
+
+<file path=ppt/slides/slide31.xml><?xml version="1.0" encoding="utf-8"?>
+<p:sld xmlns:a="http://schemas.openxmlformats.org/drawingml/2006/main" xmlns:r="http://schemas.openxmlformats.org/officeDocument/2006/relationships" xmlns:p="http://schemas.openxmlformats.org/presentationml/2006/main">
+  <p:cSld>
+    <p:spTree>
+      <p:nvGrpSpPr>
+        <p:cNvPr id="1" name=""/>
+        <p:cNvGrpSpPr/>
+        <p:nvPr/>
+      </p:nvGrpSpPr>
+      <p:grpSpPr>
+        <a:xfrm>
+          <a:off x="0" y="0"/>
+          <a:ext cx="0" cy="0"/>
+          <a:chOff x="0" y="0"/>
+          <a:chExt cx="0" cy="0"/>
+        </a:xfrm>
+      </p:grpSpPr>
+      <p:sp>
+        <p:nvSpPr>
+          <p:cNvPr id="2" name="Title 1">
+            <a:extLst>
+              <a:ext uri="{FF2B5EF4-FFF2-40B4-BE49-F238E27FC236}">
+                <a16:creationId xmlns:a16="http://schemas.microsoft.com/office/drawing/2014/main" id="{023873CD-D3EB-2247-2B07-5FFA135B3C0D}"/>
+              </a:ext>
+            </a:extLst>
+          </p:cNvPr>
+          <p:cNvSpPr>
+            <a:spLocks noGrp="1"/>
+          </p:cNvSpPr>
+          <p:nvPr>
+            <p:ph type="title"/>
+          </p:nvPr>
+        </p:nvSpPr>
+        <p:spPr>
+          <a:xfrm>
+            <a:off x="120570" y="18255"/>
+            <a:ext cx="10515600" cy="1325563"/>
+          </a:xfrm>
+        </p:spPr>
+        <p:txBody>
+          <a:bodyPr/>
+          <a:lstStyle/>
+          <a:p>
+            <a:r>
+              <a:rPr lang="en-US" b="1" dirty="0"/>
+              <a:t>How to select a phase?</a:t>
+            </a:r>
+            <a:endParaRPr lang="en-NL" b="1" dirty="0"/>
+          </a:p>
+        </p:txBody>
+      </p:sp>
+      <p:sp>
+        <p:nvSpPr>
+          <p:cNvPr id="3" name="Content Placeholder 2">
+            <a:extLst>
+              <a:ext uri="{FF2B5EF4-FFF2-40B4-BE49-F238E27FC236}">
+                <a16:creationId xmlns:a16="http://schemas.microsoft.com/office/drawing/2014/main" id="{1773A26D-8E52-43B4-2736-B06F556A0531}"/>
+              </a:ext>
+            </a:extLst>
+          </p:cNvPr>
+          <p:cNvSpPr>
+            <a:spLocks noGrp="1"/>
+          </p:cNvSpPr>
+          <p:nvPr>
+            <p:ph idx="1"/>
+          </p:nvPr>
+        </p:nvSpPr>
+        <p:spPr>
+          <a:xfrm>
+            <a:off x="450448" y="1437873"/>
+            <a:ext cx="10515600" cy="4351338"/>
+          </a:xfrm>
+        </p:spPr>
+        <p:txBody>
+          <a:bodyPr>
+            <a:normAutofit fontScale="92500" lnSpcReduction="10000"/>
+          </a:bodyPr>
+          <a:lstStyle/>
+          <a:p>
+            <a:r>
+              <a:rPr lang="en-US" dirty="0"/>
+              <a:t>Add a default phase with the </a:t>
+            </a:r>
+            <a:r>
+              <a:rPr lang="en-US" sz="2400" b="1" dirty="0" err="1">
+                <a:latin typeface="Courier New" panose="02070309020205020404" pitchFamily="49" charset="0"/>
+                <a:cs typeface="Courier New" panose="02070309020205020404" pitchFamily="49" charset="0"/>
+              </a:rPr>
+              <a:t>defaultPhase</a:t>
+            </a:r>
+            <a:r>
+              <a:rPr lang="en-US" sz="2400" b="1" dirty="0">
+                <a:latin typeface="Courier New" panose="02070309020205020404" pitchFamily="49" charset="0"/>
+                <a:cs typeface="Courier New" panose="02070309020205020404" pitchFamily="49" charset="0"/>
+              </a:rPr>
+              <a:t>="…" </a:t>
+            </a:r>
+            <a:r>
+              <a:rPr lang="en-US" dirty="0"/>
+              <a:t>attribute (on the root element)</a:t>
+            </a:r>
+          </a:p>
+          <a:p>
+            <a:r>
+              <a:rPr lang="en-US" dirty="0"/>
+              <a:t>oXygen will automatically recognize that there are phases and show a dialog to choose one:</a:t>
+            </a:r>
+          </a:p>
+          <a:p>
+            <a:endParaRPr lang="en-US" dirty="0"/>
+          </a:p>
+          <a:p>
+            <a:endParaRPr lang="en-US" dirty="0"/>
+          </a:p>
+          <a:p>
+            <a:endParaRPr lang="en-US" dirty="0"/>
+          </a:p>
+          <a:p>
+            <a:endParaRPr lang="en-US" dirty="0"/>
+          </a:p>
+          <a:p>
+            <a:endParaRPr lang="en-US" dirty="0"/>
+          </a:p>
+          <a:p>
+            <a:r>
+              <a:rPr lang="en-US" dirty="0"/>
+              <a:t>On the command line: </a:t>
+            </a:r>
+            <a:r>
+              <a:rPr lang="en-US" sz="2400" b="1" dirty="0">
+                <a:latin typeface="Courier New" panose="02070309020205020404" pitchFamily="49" charset="0"/>
+                <a:cs typeface="Courier New" panose="02070309020205020404" pitchFamily="49" charset="0"/>
+              </a:rPr>
+              <a:t>-p </a:t>
+            </a:r>
+            <a:r>
+              <a:rPr lang="en-US" sz="2400" b="1" i="1" dirty="0">
+                <a:latin typeface="Courier New" panose="02070309020205020404" pitchFamily="49" charset="0"/>
+                <a:cs typeface="Courier New" panose="02070309020205020404" pitchFamily="49" charset="0"/>
+              </a:rPr>
+              <a:t>phase</a:t>
+            </a:r>
+            <a:r>
+              <a:rPr lang="en-US" sz="2400" b="1" dirty="0">
+                <a:latin typeface="Courier New" panose="02070309020205020404" pitchFamily="49" charset="0"/>
+                <a:cs typeface="Courier New" panose="02070309020205020404" pitchFamily="49" charset="0"/>
+              </a:rPr>
+              <a:t> </a:t>
+            </a:r>
+            <a:r>
+              <a:rPr lang="en-US" dirty="0"/>
+              <a:t>option</a:t>
+            </a:r>
+            <a:endParaRPr lang="en-NL" dirty="0"/>
+          </a:p>
+        </p:txBody>
+      </p:sp>
+      <p:pic>
+        <p:nvPicPr>
+          <p:cNvPr id="5" name="Picture 4">
+            <a:extLst>
+              <a:ext uri="{FF2B5EF4-FFF2-40B4-BE49-F238E27FC236}">
+                <a16:creationId xmlns:a16="http://schemas.microsoft.com/office/drawing/2014/main" id="{981875C8-C2CF-5876-50C9-17FF7F26C0A1}"/>
+              </a:ext>
+            </a:extLst>
+          </p:cNvPr>
+          <p:cNvPicPr>
+            <a:picLocks noChangeAspect="1"/>
+          </p:cNvPicPr>
+          <p:nvPr/>
+        </p:nvPicPr>
+        <p:blipFill>
+          <a:blip r:embed="rId2"/>
+          <a:stretch>
+            <a:fillRect/>
+          </a:stretch>
+        </p:blipFill>
+        <p:spPr>
+          <a:xfrm>
+            <a:off x="3826376" y="2674886"/>
+            <a:ext cx="2620723" cy="2437002"/>
+          </a:xfrm>
+          <a:prstGeom prst="rect">
+            <a:avLst/>
+          </a:prstGeom>
+        </p:spPr>
+      </p:pic>
+    </p:spTree>
+    <p:extLst>
+      <p:ext uri="{BB962C8B-B14F-4D97-AF65-F5344CB8AC3E}">
+        <p14:creationId xmlns:p14="http://schemas.microsoft.com/office/powerpoint/2010/main" val="1564604570"/>
+      </p:ext>
+    </p:extLst>
+  </p:cSld>
+  <p:clrMapOvr>
+    <a:masterClrMapping/>
+  </p:clrMapOvr>
+</p:sld>
+</file>
+
+<file path=ppt/slides/slide32.xml><?xml version="1.0" encoding="utf-8"?>
+<p:sld xmlns:a="http://schemas.openxmlformats.org/drawingml/2006/main" xmlns:r="http://schemas.openxmlformats.org/officeDocument/2006/relationships" xmlns:p="http://schemas.openxmlformats.org/presentationml/2006/main">
+  <p:cSld>
+    <p:spTree>
+      <p:nvGrpSpPr>
+        <p:cNvPr id="1" name=""/>
+        <p:cNvGrpSpPr/>
+        <p:nvPr/>
+      </p:nvGrpSpPr>
+      <p:grpSpPr>
+        <a:xfrm>
+          <a:off x="0" y="0"/>
+          <a:ext cx="0" cy="0"/>
+          <a:chOff x="0" y="0"/>
+          <a:chExt cx="0" cy="0"/>
+        </a:xfrm>
+      </p:grpSpPr>
+      <p:sp>
+        <p:nvSpPr>
+          <p:cNvPr id="2" name="Title 1">
+            <a:extLst>
+              <a:ext uri="{FF2B5EF4-FFF2-40B4-BE49-F238E27FC236}">
+                <a16:creationId xmlns:a16="http://schemas.microsoft.com/office/drawing/2014/main" id="{A70F358F-267E-458C-A8D5-5959F20DB9D5}"/>
+              </a:ext>
+            </a:extLst>
+          </p:cNvPr>
+          <p:cNvSpPr>
+            <a:spLocks noGrp="1"/>
+          </p:cNvSpPr>
+          <p:nvPr>
+            <p:ph type="title"/>
+          </p:nvPr>
+        </p:nvSpPr>
+        <p:spPr>
+          <a:xfrm>
+            <a:off x="1218674" y="-179178"/>
+            <a:ext cx="10515600" cy="1325563"/>
+          </a:xfrm>
+        </p:spPr>
+        <p:txBody>
+          <a:bodyPr/>
+          <a:lstStyle/>
+          <a:p>
+            <a:r>
+              <a:rPr lang="en-US" b="1" dirty="0"/>
+              <a:t>Hands-on: Using phases</a:t>
+            </a:r>
+            <a:endParaRPr lang="en-NL" b="1" dirty="0"/>
+          </a:p>
+        </p:txBody>
+      </p:sp>
+      <p:sp>
+        <p:nvSpPr>
+          <p:cNvPr id="3" name="Content Placeholder 2">
+            <a:extLst>
+              <a:ext uri="{FF2B5EF4-FFF2-40B4-BE49-F238E27FC236}">
+                <a16:creationId xmlns:a16="http://schemas.microsoft.com/office/drawing/2014/main" id="{B7E5CA6D-D83C-4F14-841A-1F3902B3B2AC}"/>
+              </a:ext>
+            </a:extLst>
+          </p:cNvPr>
+          <p:cNvSpPr>
+            <a:spLocks noGrp="1"/>
+          </p:cNvSpPr>
+          <p:nvPr>
+            <p:ph idx="1"/>
+          </p:nvPr>
+        </p:nvSpPr>
+        <p:spPr>
+          <a:xfrm>
+            <a:off x="249766" y="1325186"/>
+            <a:ext cx="11826620" cy="4899039"/>
+          </a:xfrm>
+        </p:spPr>
+        <p:txBody>
+          <a:bodyPr>
+            <a:normAutofit fontScale="92500" lnSpcReduction="10000"/>
+          </a:bodyPr>
+          <a:lstStyle/>
+          <a:p>
+            <a:r>
+              <a:rPr lang="en-US" dirty="0"/>
+              <a:t>All files in:  </a:t>
+            </a:r>
+            <a:r>
+              <a:rPr lang="en-US" b="1" dirty="0">
+                <a:latin typeface="Courier New" panose="02070309020205020404" pitchFamily="49" charset="0"/>
+                <a:cs typeface="Courier New" panose="02070309020205020404" pitchFamily="49" charset="0"/>
+              </a:rPr>
+              <a:t>…/exercises</a:t>
+            </a:r>
+            <a:r>
+              <a:rPr lang="en-US" dirty="0">
+                <a:latin typeface="Courier New" panose="02070309020205020404" pitchFamily="49" charset="0"/>
+                <a:cs typeface="Courier New" panose="02070309020205020404" pitchFamily="49" charset="0"/>
+              </a:rPr>
+              <a:t>/</a:t>
+            </a:r>
+            <a:r>
+              <a:rPr lang="en-US" b="1" dirty="0">
+                <a:latin typeface="Courier New" panose="02070309020205020404" pitchFamily="49" charset="0"/>
+                <a:cs typeface="Courier New" panose="02070309020205020404" pitchFamily="49" charset="0"/>
+              </a:rPr>
+              <a:t>exercise-03-02</a:t>
+            </a:r>
+          </a:p>
+          <a:p>
+            <a:endParaRPr lang="en-US" dirty="0"/>
+          </a:p>
+          <a:p>
+            <a:r>
+              <a:rPr lang="en-US" dirty="0"/>
+              <a:t>Read the instructions in:  </a:t>
+            </a:r>
+            <a:r>
+              <a:rPr lang="en-US" b="1" dirty="0">
+                <a:latin typeface="Courier New" panose="02070309020205020404" pitchFamily="49" charset="0"/>
+                <a:cs typeface="Courier New" panose="02070309020205020404" pitchFamily="49" charset="0"/>
+              </a:rPr>
+              <a:t>instructions.pdf</a:t>
+            </a:r>
+            <a:endParaRPr lang="en-US" dirty="0"/>
+          </a:p>
+          <a:p>
+            <a:r>
+              <a:rPr lang="en-US" dirty="0"/>
+              <a:t>Open the files:</a:t>
+            </a:r>
+          </a:p>
+          <a:p>
+            <a:pPr lvl="1"/>
+            <a:r>
+              <a:rPr lang="en-US" dirty="0"/>
+              <a:t>Document to validate: </a:t>
+            </a:r>
+            <a:r>
+              <a:rPr lang="en-US" b="1" dirty="0">
+                <a:latin typeface="Courier New" panose="02070309020205020404" pitchFamily="49" charset="0"/>
+                <a:cs typeface="Courier New" panose="02070309020205020404" pitchFamily="49" charset="0"/>
+              </a:rPr>
+              <a:t>input.xml</a:t>
+            </a:r>
+          </a:p>
+          <a:p>
+            <a:pPr lvl="1"/>
+            <a:r>
+              <a:rPr lang="en-US" dirty="0"/>
+              <a:t>Template Schematron schema: </a:t>
+            </a:r>
+            <a:r>
+              <a:rPr lang="en-US" b="1" dirty="0" err="1">
+                <a:latin typeface="Courier New" panose="02070309020205020404" pitchFamily="49" charset="0"/>
+                <a:cs typeface="Courier New" panose="02070309020205020404" pitchFamily="49" charset="0"/>
+              </a:rPr>
+              <a:t>template.sch</a:t>
+            </a:r>
+            <a:endParaRPr lang="en-US" b="1" dirty="0">
+              <a:latin typeface="Courier New" panose="02070309020205020404" pitchFamily="49" charset="0"/>
+              <a:cs typeface="Courier New" panose="02070309020205020404" pitchFamily="49" charset="0"/>
+            </a:endParaRPr>
+          </a:p>
+          <a:p>
+            <a:r>
+              <a:rPr lang="en-US" dirty="0"/>
+              <a:t>Enhance </a:t>
+            </a:r>
+            <a:r>
+              <a:rPr lang="en-US" b="1" dirty="0" err="1">
+                <a:latin typeface="Courier New" panose="02070309020205020404" pitchFamily="49" charset="0"/>
+                <a:cs typeface="Courier New" panose="02070309020205020404" pitchFamily="49" charset="0"/>
+              </a:rPr>
+              <a:t>template.sch</a:t>
+            </a:r>
+            <a:r>
+              <a:rPr lang="en-US" dirty="0"/>
+              <a:t> according to the instructions </a:t>
+            </a:r>
+          </a:p>
+          <a:p>
+            <a:r>
+              <a:rPr lang="en-US" dirty="0"/>
+              <a:t>To try it out in oXygen, </a:t>
+            </a:r>
+            <a:r>
+              <a:rPr lang="en-US" b="1" dirty="0">
+                <a:latin typeface="Courier New" panose="02070309020205020404" pitchFamily="49" charset="0"/>
+                <a:cs typeface="Courier New" panose="02070309020205020404" pitchFamily="49" charset="0"/>
+              </a:rPr>
+              <a:t>input.xml</a:t>
+            </a:r>
+            <a:r>
+              <a:rPr lang="en-US" dirty="0"/>
+              <a:t> is automatically validated by </a:t>
+            </a:r>
+            <a:r>
+              <a:rPr lang="en-US" b="1" dirty="0" err="1">
+                <a:latin typeface="Courier New" panose="02070309020205020404" pitchFamily="49" charset="0"/>
+                <a:cs typeface="Courier New" panose="02070309020205020404" pitchFamily="49" charset="0"/>
+              </a:rPr>
+              <a:t>template.sch</a:t>
+            </a:r>
+            <a:endParaRPr lang="en-US" b="1" dirty="0">
+              <a:latin typeface="Courier New" panose="02070309020205020404" pitchFamily="49" charset="0"/>
+              <a:cs typeface="Courier New" panose="02070309020205020404" pitchFamily="49" charset="0"/>
+            </a:endParaRPr>
+          </a:p>
+          <a:p>
+            <a:endParaRPr lang="en-US" dirty="0"/>
+          </a:p>
+          <a:p>
+            <a:endParaRPr lang="en-US" dirty="0"/>
+          </a:p>
+          <a:p>
+            <a:pPr marL="0" indent="0">
+              <a:buNone/>
+            </a:pPr>
+            <a:r>
+              <a:rPr lang="en-US" sz="2200" dirty="0"/>
+              <a:t>Possible solution in: </a:t>
+            </a:r>
+            <a:r>
+              <a:rPr lang="en-US" sz="2200" b="1" dirty="0">
+                <a:latin typeface="Courier New" panose="02070309020205020404" pitchFamily="49" charset="0"/>
+                <a:cs typeface="Courier New" panose="02070309020205020404" pitchFamily="49" charset="0"/>
+              </a:rPr>
+              <a:t>solution/</a:t>
+            </a:r>
+            <a:r>
+              <a:rPr lang="en-US" sz="2200" b="1" dirty="0" err="1">
+                <a:latin typeface="Courier New" panose="02070309020205020404" pitchFamily="49" charset="0"/>
+                <a:cs typeface="Courier New" panose="02070309020205020404" pitchFamily="49" charset="0"/>
+              </a:rPr>
+              <a:t>solution.sch</a:t>
+            </a:r>
+            <a:r>
+              <a:rPr lang="en-US" sz="2200" dirty="0"/>
+              <a:t> (short explanation in </a:t>
+            </a:r>
+            <a:r>
+              <a:rPr lang="en-US" sz="2200" b="1" dirty="0">
+                <a:latin typeface="Courier New" panose="02070309020205020404" pitchFamily="49" charset="0"/>
+                <a:cs typeface="Courier New" panose="02070309020205020404" pitchFamily="49" charset="0"/>
+              </a:rPr>
+              <a:t>solution/explanation.pdf</a:t>
+            </a:r>
+            <a:r>
+              <a:rPr lang="en-US" sz="2200" dirty="0"/>
+              <a:t>).</a:t>
+            </a:r>
+          </a:p>
+          <a:p>
+            <a:pPr marL="0" indent="0">
+              <a:buNone/>
+            </a:pPr>
+            <a:endParaRPr lang="en-US" sz="2200" dirty="0"/>
+          </a:p>
+          <a:p>
+            <a:endParaRPr lang="en-GB" dirty="0"/>
+          </a:p>
+        </p:txBody>
+      </p:sp>
+      <p:pic>
+        <p:nvPicPr>
+          <p:cNvPr id="6" name="Graphic 5" descr="Right pointing backhand index ">
+            <a:extLst>
+              <a:ext uri="{FF2B5EF4-FFF2-40B4-BE49-F238E27FC236}">
+                <a16:creationId xmlns:a16="http://schemas.microsoft.com/office/drawing/2014/main" id="{BA7FB8C5-2AEE-41C3-980A-64845E036DE8}"/>
+              </a:ext>
+            </a:extLst>
+          </p:cNvPr>
+          <p:cNvPicPr>
+            <a:picLocks noChangeAspect="1"/>
+          </p:cNvPicPr>
+          <p:nvPr/>
+        </p:nvPicPr>
+        <p:blipFill>
+          <a:blip r:embed="rId3">
+            <a:extLst>
+              <a:ext uri="{28A0092B-C50C-407E-A947-70E740481C1C}">
+                <a14:useLocalDpi xmlns:a14="http://schemas.microsoft.com/office/drawing/2010/main" val="0"/>
+              </a:ext>
+              <a:ext uri="{96DAC541-7B7A-43D3-8B79-37D633B846F1}">
+                <asvg:svgBlip xmlns:asvg="http://schemas.microsoft.com/office/drawing/2016/SVG/main" r:embed="rId4"/>
+              </a:ext>
+            </a:extLst>
+          </a:blip>
+          <a:stretch>
+            <a:fillRect/>
+          </a:stretch>
+        </p:blipFill>
+        <p:spPr>
+          <a:xfrm>
+            <a:off x="249766" y="26404"/>
+            <a:ext cx="914400" cy="914400"/>
+          </a:xfrm>
+          <a:prstGeom prst="rect">
+            <a:avLst/>
+          </a:prstGeom>
+        </p:spPr>
+      </p:pic>
+    </p:spTree>
+    <p:extLst>
+      <p:ext uri="{BB962C8B-B14F-4D97-AF65-F5344CB8AC3E}">
+        <p14:creationId xmlns:p14="http://schemas.microsoft.com/office/powerpoint/2010/main" val="4145912420"/>
+      </p:ext>
+    </p:extLst>
+  </p:cSld>
+  <p:clrMapOvr>
+    <a:masterClrMapping/>
+  </p:clrMapOvr>
+</p:sld>
+</file>
+
+<file path=ppt/slides/slide33.xml><?xml version="1.0" encoding="utf-8"?>
+<p:sld xmlns:a="http://schemas.openxmlformats.org/drawingml/2006/main" xmlns:r="http://schemas.openxmlformats.org/officeDocument/2006/relationships" xmlns:p="http://schemas.openxmlformats.org/presentationml/2006/main">
+  <p:cSld>
+    <p:spTree>
+      <p:nvGrpSpPr>
+        <p:cNvPr id="1" name=""/>
+        <p:cNvGrpSpPr/>
+        <p:nvPr/>
+      </p:nvGrpSpPr>
+      <p:grpSpPr>
+        <a:xfrm>
+          <a:off x="0" y="0"/>
+          <a:ext cx="0" cy="0"/>
+          <a:chOff x="0" y="0"/>
+          <a:chExt cx="0" cy="0"/>
+        </a:xfrm>
+      </p:grpSpPr>
+      <p:sp>
+        <p:nvSpPr>
+          <p:cNvPr id="2" name="Title 1">
+            <a:extLst>
+              <a:ext uri="{FF2B5EF4-FFF2-40B4-BE49-F238E27FC236}">
+                <a16:creationId xmlns:a16="http://schemas.microsoft.com/office/drawing/2014/main" id="{143F979C-CA86-AE0D-1B71-C61F31ADE85A}"/>
+              </a:ext>
+            </a:extLst>
+          </p:cNvPr>
+          <p:cNvSpPr>
+            <a:spLocks noGrp="1"/>
+          </p:cNvSpPr>
+          <p:nvPr>
+            <p:ph type="title"/>
+          </p:nvPr>
+        </p:nvSpPr>
+        <p:spPr>
+          <a:xfrm>
+            <a:off x="396765" y="80552"/>
+            <a:ext cx="10515600" cy="1082922"/>
+          </a:xfrm>
+        </p:spPr>
+        <p:txBody>
+          <a:bodyPr/>
+          <a:lstStyle/>
+          <a:p>
+            <a:r>
+              <a:rPr lang="en-US" b="1" dirty="0"/>
+              <a:t>Reusing messages: diagnostics</a:t>
+            </a:r>
+            <a:endParaRPr lang="en-NL" b="1" dirty="0"/>
+          </a:p>
+        </p:txBody>
+      </p:sp>
+      <p:sp>
+        <p:nvSpPr>
+          <p:cNvPr id="4" name="TextBox 3">
+            <a:extLst>
+              <a:ext uri="{FF2B5EF4-FFF2-40B4-BE49-F238E27FC236}">
+                <a16:creationId xmlns:a16="http://schemas.microsoft.com/office/drawing/2014/main" id="{0B792318-938D-97E5-71E9-48F246A27C07}"/>
+              </a:ext>
+            </a:extLst>
+          </p:cNvPr>
+          <p:cNvSpPr txBox="1"/>
+          <p:nvPr/>
+        </p:nvSpPr>
+        <p:spPr>
+          <a:xfrm>
+            <a:off x="842690" y="1419756"/>
+            <a:ext cx="9406694" cy="3170099"/>
+          </a:xfrm>
+          <a:prstGeom prst="rect">
+            <a:avLst/>
+          </a:prstGeom>
+          <a:solidFill>
+            <a:schemeClr val="bg1">
+              <a:lumMod val="95000"/>
+            </a:schemeClr>
+          </a:solidFill>
+        </p:spPr>
+        <p:txBody>
+          <a:bodyPr wrap="square" rtlCol="0">
+            <a:spAutoFit/>
+          </a:bodyPr>
+          <a:lstStyle/>
+          <a:p>
+            <a:r>
+              <a:rPr lang="de-DE" sz="2000" b="1" dirty="0">
+                <a:latin typeface="Courier New" panose="02070309020205020404" pitchFamily="49" charset="0"/>
+                <a:cs typeface="Courier New" panose="02070309020205020404" pitchFamily="49" charset="0"/>
+              </a:rPr>
+              <a:t>&lt;</a:t>
+            </a:r>
+            <a:r>
+              <a:rPr lang="de-DE" sz="2000" b="1" dirty="0" err="1">
+                <a:latin typeface="Courier New" panose="02070309020205020404" pitchFamily="49" charset="0"/>
+                <a:cs typeface="Courier New" panose="02070309020205020404" pitchFamily="49" charset="0"/>
+              </a:rPr>
+              <a:t>pattern</a:t>
+            </a:r>
+            <a:r>
+              <a:rPr lang="de-DE" sz="2000" b="1" dirty="0">
+                <a:latin typeface="Courier New" panose="02070309020205020404" pitchFamily="49" charset="0"/>
+                <a:cs typeface="Courier New" panose="02070309020205020404" pitchFamily="49" charset="0"/>
+              </a:rPr>
+              <a:t>&gt;</a:t>
+            </a:r>
+          </a:p>
+          <a:p>
+            <a:r>
+              <a:rPr lang="de-DE" sz="2000" b="1" dirty="0">
+                <a:latin typeface="Courier New" panose="02070309020205020404" pitchFamily="49" charset="0"/>
+                <a:cs typeface="Courier New" panose="02070309020205020404" pitchFamily="49" charset="0"/>
+              </a:rPr>
+              <a:t>  &lt;</a:t>
+            </a:r>
+            <a:r>
+              <a:rPr lang="de-DE" sz="2000" b="1" dirty="0" err="1">
+                <a:latin typeface="Courier New" panose="02070309020205020404" pitchFamily="49" charset="0"/>
+                <a:cs typeface="Courier New" panose="02070309020205020404" pitchFamily="49" charset="0"/>
+              </a:rPr>
+              <a:t>rule</a:t>
+            </a:r>
+            <a:r>
+              <a:rPr lang="de-DE" sz="2000" b="1" dirty="0">
+                <a:latin typeface="Courier New" panose="02070309020205020404" pitchFamily="49" charset="0"/>
+                <a:cs typeface="Courier New" panose="02070309020205020404" pitchFamily="49" charset="0"/>
+              </a:rPr>
+              <a:t> </a:t>
+            </a:r>
+            <a:r>
+              <a:rPr lang="de-DE" sz="2000" b="1" dirty="0" err="1">
+                <a:latin typeface="Courier New" panose="02070309020205020404" pitchFamily="49" charset="0"/>
+                <a:cs typeface="Courier New" panose="02070309020205020404" pitchFamily="49" charset="0"/>
+              </a:rPr>
+              <a:t>context</a:t>
+            </a:r>
+            <a:r>
+              <a:rPr lang="de-DE" sz="2000" b="1" dirty="0">
+                <a:latin typeface="Courier New" panose="02070309020205020404" pitchFamily="49" charset="0"/>
+                <a:cs typeface="Courier New" panose="02070309020205020404" pitchFamily="49" charset="0"/>
+              </a:rPr>
+              <a:t>="…"&gt;</a:t>
+            </a:r>
+          </a:p>
+          <a:p>
+            <a:r>
+              <a:rPr lang="de-DE" sz="2000" b="1" dirty="0">
+                <a:latin typeface="Courier New" panose="02070309020205020404" pitchFamily="49" charset="0"/>
+                <a:cs typeface="Courier New" panose="02070309020205020404" pitchFamily="49" charset="0"/>
+              </a:rPr>
+              <a:t>    &lt;</a:t>
+            </a:r>
+            <a:r>
+              <a:rPr lang="de-DE" sz="2000" b="1" dirty="0" err="1">
+                <a:latin typeface="Courier New" panose="02070309020205020404" pitchFamily="49" charset="0"/>
+                <a:cs typeface="Courier New" panose="02070309020205020404" pitchFamily="49" charset="0"/>
+              </a:rPr>
+              <a:t>assert</a:t>
+            </a:r>
+            <a:r>
+              <a:rPr lang="de-DE" sz="2000" b="1" dirty="0">
+                <a:latin typeface="Courier New" panose="02070309020205020404" pitchFamily="49" charset="0"/>
+                <a:cs typeface="Courier New" panose="02070309020205020404" pitchFamily="49" charset="0"/>
+              </a:rPr>
+              <a:t> </a:t>
+            </a:r>
+            <a:r>
+              <a:rPr lang="de-DE" sz="2000" b="1" dirty="0" err="1">
+                <a:latin typeface="Courier New" panose="02070309020205020404" pitchFamily="49" charset="0"/>
+                <a:cs typeface="Courier New" panose="02070309020205020404" pitchFamily="49" charset="0"/>
+              </a:rPr>
+              <a:t>test</a:t>
+            </a:r>
+            <a:r>
+              <a:rPr lang="de-DE" sz="2000" b="1" dirty="0">
+                <a:latin typeface="Courier New" panose="02070309020205020404" pitchFamily="49" charset="0"/>
+                <a:cs typeface="Courier New" panose="02070309020205020404" pitchFamily="49" charset="0"/>
+              </a:rPr>
+              <a:t>="…" </a:t>
+            </a:r>
+            <a:r>
+              <a:rPr lang="de-DE" sz="2000" b="1" dirty="0" err="1">
+                <a:latin typeface="Courier New" panose="02070309020205020404" pitchFamily="49" charset="0"/>
+                <a:cs typeface="Courier New" panose="02070309020205020404" pitchFamily="49" charset="0"/>
+              </a:rPr>
+              <a:t>diagnostics</a:t>
+            </a:r>
+            <a:r>
+              <a:rPr lang="de-DE" sz="2000" b="1" dirty="0">
+                <a:latin typeface="Courier New" panose="02070309020205020404" pitchFamily="49" charset="0"/>
+                <a:cs typeface="Courier New" panose="02070309020205020404" pitchFamily="49" charset="0"/>
+              </a:rPr>
+              <a:t>="message-1"/&gt;</a:t>
+            </a:r>
+          </a:p>
+          <a:p>
+            <a:r>
+              <a:rPr lang="de-DE" sz="2000" b="1" dirty="0">
+                <a:latin typeface="Courier New" panose="02070309020205020404" pitchFamily="49" charset="0"/>
+                <a:cs typeface="Courier New" panose="02070309020205020404" pitchFamily="49" charset="0"/>
+              </a:rPr>
+              <a:t>    &lt;</a:t>
+            </a:r>
+            <a:r>
+              <a:rPr lang="de-DE" sz="2000" b="1" dirty="0" err="1">
+                <a:latin typeface="Courier New" panose="02070309020205020404" pitchFamily="49" charset="0"/>
+                <a:cs typeface="Courier New" panose="02070309020205020404" pitchFamily="49" charset="0"/>
+              </a:rPr>
+              <a:t>assert</a:t>
+            </a:r>
+            <a:r>
+              <a:rPr lang="de-DE" sz="2000" b="1" dirty="0">
+                <a:latin typeface="Courier New" panose="02070309020205020404" pitchFamily="49" charset="0"/>
+                <a:cs typeface="Courier New" panose="02070309020205020404" pitchFamily="49" charset="0"/>
+              </a:rPr>
+              <a:t> </a:t>
+            </a:r>
+            <a:r>
+              <a:rPr lang="de-DE" sz="2000" b="1" dirty="0" err="1">
+                <a:latin typeface="Courier New" panose="02070309020205020404" pitchFamily="49" charset="0"/>
+                <a:cs typeface="Courier New" panose="02070309020205020404" pitchFamily="49" charset="0"/>
+              </a:rPr>
+              <a:t>test</a:t>
+            </a:r>
+            <a:r>
+              <a:rPr lang="de-DE" sz="2000" b="1" dirty="0">
+                <a:latin typeface="Courier New" panose="02070309020205020404" pitchFamily="49" charset="0"/>
+                <a:cs typeface="Courier New" panose="02070309020205020404" pitchFamily="49" charset="0"/>
+              </a:rPr>
+              <a:t>="…" </a:t>
+            </a:r>
+            <a:r>
+              <a:rPr lang="de-DE" sz="2000" b="1" dirty="0" err="1">
+                <a:latin typeface="Courier New" panose="02070309020205020404" pitchFamily="49" charset="0"/>
+                <a:cs typeface="Courier New" panose="02070309020205020404" pitchFamily="49" charset="0"/>
+              </a:rPr>
+              <a:t>diagnostics</a:t>
+            </a:r>
+            <a:r>
+              <a:rPr lang="de-DE" sz="2000" b="1" dirty="0">
+                <a:latin typeface="Courier New" panose="02070309020205020404" pitchFamily="49" charset="0"/>
+                <a:cs typeface="Courier New" panose="02070309020205020404" pitchFamily="49" charset="0"/>
+              </a:rPr>
+              <a:t>="message-1"/&gt;</a:t>
+            </a:r>
+          </a:p>
+          <a:p>
+            <a:r>
+              <a:rPr lang="de-DE" sz="2000" b="1" dirty="0">
+                <a:latin typeface="Courier New" panose="02070309020205020404" pitchFamily="49" charset="0"/>
+                <a:cs typeface="Courier New" panose="02070309020205020404" pitchFamily="49" charset="0"/>
+              </a:rPr>
+              <a:t>  &lt;/</a:t>
+            </a:r>
+            <a:r>
+              <a:rPr lang="de-DE" sz="2000" b="1" dirty="0" err="1">
+                <a:latin typeface="Courier New" panose="02070309020205020404" pitchFamily="49" charset="0"/>
+                <a:cs typeface="Courier New" panose="02070309020205020404" pitchFamily="49" charset="0"/>
+              </a:rPr>
+              <a:t>rule</a:t>
+            </a:r>
+            <a:r>
+              <a:rPr lang="de-DE" sz="2000" b="1" dirty="0">
+                <a:latin typeface="Courier New" panose="02070309020205020404" pitchFamily="49" charset="0"/>
+                <a:cs typeface="Courier New" panose="02070309020205020404" pitchFamily="49" charset="0"/>
+              </a:rPr>
+              <a:t>&gt;</a:t>
+            </a:r>
+          </a:p>
+          <a:p>
+            <a:r>
+              <a:rPr lang="de-DE" sz="2000" b="1" dirty="0">
+                <a:latin typeface="Courier New" panose="02070309020205020404" pitchFamily="49" charset="0"/>
+                <a:cs typeface="Courier New" panose="02070309020205020404" pitchFamily="49" charset="0"/>
+              </a:rPr>
+              <a:t>&lt;/</a:t>
+            </a:r>
+            <a:r>
+              <a:rPr lang="de-DE" sz="2000" b="1" dirty="0" err="1">
+                <a:latin typeface="Courier New" panose="02070309020205020404" pitchFamily="49" charset="0"/>
+                <a:cs typeface="Courier New" panose="02070309020205020404" pitchFamily="49" charset="0"/>
+              </a:rPr>
+              <a:t>pattern</a:t>
+            </a:r>
+            <a:r>
+              <a:rPr lang="de-DE" sz="2000" b="1" dirty="0">
+                <a:latin typeface="Courier New" panose="02070309020205020404" pitchFamily="49" charset="0"/>
+                <a:cs typeface="Courier New" panose="02070309020205020404" pitchFamily="49" charset="0"/>
+              </a:rPr>
+              <a:t>&gt;</a:t>
+            </a:r>
+          </a:p>
+          <a:p>
+            <a:endParaRPr lang="de-DE" sz="2000" b="1" dirty="0">
+              <a:latin typeface="Courier New" panose="02070309020205020404" pitchFamily="49" charset="0"/>
+              <a:cs typeface="Courier New" panose="02070309020205020404" pitchFamily="49" charset="0"/>
+            </a:endParaRPr>
+          </a:p>
+          <a:p>
+            <a:r>
+              <a:rPr lang="de-DE" sz="2000" b="1" dirty="0">
+                <a:latin typeface="Courier New" panose="02070309020205020404" pitchFamily="49" charset="0"/>
+                <a:cs typeface="Courier New" panose="02070309020205020404" pitchFamily="49" charset="0"/>
+              </a:rPr>
+              <a:t>&lt;</a:t>
+            </a:r>
+            <a:r>
+              <a:rPr lang="de-DE" sz="2000" b="1" dirty="0" err="1">
+                <a:latin typeface="Courier New" panose="02070309020205020404" pitchFamily="49" charset="0"/>
+                <a:cs typeface="Courier New" panose="02070309020205020404" pitchFamily="49" charset="0"/>
+              </a:rPr>
+              <a:t>diagnostics</a:t>
+            </a:r>
+            <a:r>
+              <a:rPr lang="de-DE" sz="2000" b="1" dirty="0">
+                <a:latin typeface="Courier New" panose="02070309020205020404" pitchFamily="49" charset="0"/>
+                <a:cs typeface="Courier New" panose="02070309020205020404" pitchFamily="49" charset="0"/>
+              </a:rPr>
+              <a:t>&gt;</a:t>
+            </a:r>
+          </a:p>
+          <a:p>
+            <a:r>
+              <a:rPr lang="de-DE" sz="2000" b="1" dirty="0">
+                <a:latin typeface="Courier New" panose="02070309020205020404" pitchFamily="49" charset="0"/>
+                <a:cs typeface="Courier New" panose="02070309020205020404" pitchFamily="49" charset="0"/>
+              </a:rPr>
+              <a:t>  &lt;</a:t>
+            </a:r>
+            <a:r>
+              <a:rPr lang="de-DE" sz="2000" b="1" dirty="0" err="1">
+                <a:latin typeface="Courier New" panose="02070309020205020404" pitchFamily="49" charset="0"/>
+                <a:cs typeface="Courier New" panose="02070309020205020404" pitchFamily="49" charset="0"/>
+              </a:rPr>
+              <a:t>diagnostic</a:t>
+            </a:r>
+            <a:r>
+              <a:rPr lang="de-DE" sz="2000" b="1" dirty="0">
+                <a:latin typeface="Courier New" panose="02070309020205020404" pitchFamily="49" charset="0"/>
+                <a:cs typeface="Courier New" panose="02070309020205020404" pitchFamily="49" charset="0"/>
+              </a:rPr>
+              <a:t> </a:t>
+            </a:r>
+            <a:r>
+              <a:rPr lang="de-DE" sz="2000" b="1" dirty="0" err="1">
+                <a:latin typeface="Courier New" panose="02070309020205020404" pitchFamily="49" charset="0"/>
+                <a:cs typeface="Courier New" panose="02070309020205020404" pitchFamily="49" charset="0"/>
+              </a:rPr>
+              <a:t>id</a:t>
+            </a:r>
+            <a:r>
+              <a:rPr lang="de-DE" sz="2000" b="1" dirty="0">
+                <a:latin typeface="Courier New" panose="02070309020205020404" pitchFamily="49" charset="0"/>
+                <a:cs typeface="Courier New" panose="02070309020205020404" pitchFamily="49" charset="0"/>
+              </a:rPr>
+              <a:t>="message-1"&gt; (</a:t>
+            </a:r>
+            <a:r>
+              <a:rPr lang="de-DE" sz="2000" b="1" dirty="0" err="1">
+                <a:latin typeface="Courier New" panose="02070309020205020404" pitchFamily="49" charset="0"/>
+                <a:cs typeface="Courier New" panose="02070309020205020404" pitchFamily="49" charset="0"/>
+              </a:rPr>
+              <a:t>the</a:t>
+            </a:r>
+            <a:r>
+              <a:rPr lang="de-DE" sz="2000" b="1" dirty="0">
+                <a:latin typeface="Courier New" panose="02070309020205020404" pitchFamily="49" charset="0"/>
+                <a:cs typeface="Courier New" panose="02070309020205020404" pitchFamily="49" charset="0"/>
+              </a:rPr>
+              <a:t> </a:t>
+            </a:r>
+            <a:r>
+              <a:rPr lang="de-DE" sz="2000" b="1" dirty="0" err="1">
+                <a:latin typeface="Courier New" panose="02070309020205020404" pitchFamily="49" charset="0"/>
+                <a:cs typeface="Courier New" panose="02070309020205020404" pitchFamily="49" charset="0"/>
+              </a:rPr>
+              <a:t>message</a:t>
+            </a:r>
+            <a:r>
+              <a:rPr lang="de-DE" sz="2000" b="1" dirty="0">
+                <a:latin typeface="Courier New" panose="02070309020205020404" pitchFamily="49" charset="0"/>
+                <a:cs typeface="Courier New" panose="02070309020205020404" pitchFamily="49" charset="0"/>
+              </a:rPr>
+              <a:t>…) &lt;/</a:t>
+            </a:r>
+            <a:r>
+              <a:rPr lang="de-DE" sz="2000" b="1" dirty="0" err="1">
+                <a:latin typeface="Courier New" panose="02070309020205020404" pitchFamily="49" charset="0"/>
+                <a:cs typeface="Courier New" panose="02070309020205020404" pitchFamily="49" charset="0"/>
+              </a:rPr>
+              <a:t>diagnostic</a:t>
+            </a:r>
+            <a:r>
+              <a:rPr lang="de-DE" sz="2000" b="1" dirty="0">
+                <a:latin typeface="Courier New" panose="02070309020205020404" pitchFamily="49" charset="0"/>
+                <a:cs typeface="Courier New" panose="02070309020205020404" pitchFamily="49" charset="0"/>
+              </a:rPr>
+              <a:t>&gt;</a:t>
+            </a:r>
+          </a:p>
+          <a:p>
+            <a:r>
+              <a:rPr lang="de-DE" sz="2000" b="1" dirty="0">
+                <a:latin typeface="Courier New" panose="02070309020205020404" pitchFamily="49" charset="0"/>
+                <a:cs typeface="Courier New" panose="02070309020205020404" pitchFamily="49" charset="0"/>
+              </a:rPr>
+              <a:t>&lt;/</a:t>
+            </a:r>
+            <a:r>
+              <a:rPr lang="de-DE" sz="2000" b="1" dirty="0" err="1">
+                <a:latin typeface="Courier New" panose="02070309020205020404" pitchFamily="49" charset="0"/>
+                <a:cs typeface="Courier New" panose="02070309020205020404" pitchFamily="49" charset="0"/>
+              </a:rPr>
+              <a:t>diagnostics</a:t>
+            </a:r>
+            <a:r>
+              <a:rPr lang="de-DE" sz="2000" b="1" dirty="0">
+                <a:latin typeface="Courier New" panose="02070309020205020404" pitchFamily="49" charset="0"/>
+                <a:cs typeface="Courier New" panose="02070309020205020404" pitchFamily="49" charset="0"/>
+              </a:rPr>
+              <a:t>&gt;</a:t>
+            </a:r>
+          </a:p>
+        </p:txBody>
+      </p:sp>
+      <p:sp>
+        <p:nvSpPr>
+          <p:cNvPr id="5" name="TextBox 4">
+            <a:extLst>
+              <a:ext uri="{FF2B5EF4-FFF2-40B4-BE49-F238E27FC236}">
+                <a16:creationId xmlns:a16="http://schemas.microsoft.com/office/drawing/2014/main" id="{0D29086C-3745-472D-2186-539644EB17FF}"/>
+              </a:ext>
+            </a:extLst>
+          </p:cNvPr>
+          <p:cNvSpPr txBox="1"/>
+          <p:nvPr/>
+        </p:nvSpPr>
+        <p:spPr>
+          <a:xfrm>
+            <a:off x="1122744" y="5266481"/>
+            <a:ext cx="7992319" cy="461665"/>
+          </a:xfrm>
+          <a:prstGeom prst="rect">
+            <a:avLst/>
+          </a:prstGeom>
+          <a:noFill/>
+        </p:spPr>
+        <p:txBody>
+          <a:bodyPr wrap="square" rtlCol="0">
+            <a:spAutoFit/>
+          </a:bodyPr>
+          <a:lstStyle/>
+          <a:p>
+            <a:r>
+              <a:rPr lang="en-US" sz="2400" dirty="0"/>
+              <a:t>Using this mechanism, you can also issue multiple messages!</a:t>
+            </a:r>
+            <a:endParaRPr lang="en-NL" sz="2400" dirty="0"/>
+          </a:p>
+        </p:txBody>
+      </p:sp>
+    </p:spTree>
+    <p:extLst>
+      <p:ext uri="{BB962C8B-B14F-4D97-AF65-F5344CB8AC3E}">
+        <p14:creationId xmlns:p14="http://schemas.microsoft.com/office/powerpoint/2010/main" val="4144954025"/>
+      </p:ext>
+    </p:extLst>
+  </p:cSld>
+  <p:clrMapOvr>
+    <a:masterClrMapping/>
+  </p:clrMapOvr>
+</p:sld>
+</file>
+
+<file path=ppt/slides/slide34.xml><?xml version="1.0" encoding="utf-8"?>
+<p:sld xmlns:a="http://schemas.openxmlformats.org/drawingml/2006/main" xmlns:r="http://schemas.openxmlformats.org/officeDocument/2006/relationships" xmlns:p="http://schemas.openxmlformats.org/presentationml/2006/main">
+  <p:cSld>
+    <p:spTree>
+      <p:nvGrpSpPr>
+        <p:cNvPr id="1" name=""/>
+        <p:cNvGrpSpPr/>
+        <p:nvPr/>
+      </p:nvGrpSpPr>
+      <p:grpSpPr>
+        <a:xfrm>
+          <a:off x="0" y="0"/>
+          <a:ext cx="0" cy="0"/>
+          <a:chOff x="0" y="0"/>
+          <a:chExt cx="0" cy="0"/>
+        </a:xfrm>
+      </p:grpSpPr>
+      <p:sp>
+        <p:nvSpPr>
+          <p:cNvPr id="2" name="Title 1">
+            <a:extLst>
+              <a:ext uri="{FF2B5EF4-FFF2-40B4-BE49-F238E27FC236}">
+                <a16:creationId xmlns:a16="http://schemas.microsoft.com/office/drawing/2014/main" id="{A70F358F-267E-458C-A8D5-5959F20DB9D5}"/>
+              </a:ext>
+            </a:extLst>
+          </p:cNvPr>
+          <p:cNvSpPr>
+            <a:spLocks noGrp="1"/>
+          </p:cNvSpPr>
+          <p:nvPr>
+            <p:ph type="title"/>
+          </p:nvPr>
+        </p:nvSpPr>
+        <p:spPr>
+          <a:xfrm>
+            <a:off x="1218674" y="-179178"/>
+            <a:ext cx="10515600" cy="1325563"/>
+          </a:xfrm>
+        </p:spPr>
+        <p:txBody>
+          <a:bodyPr/>
+          <a:lstStyle/>
+          <a:p>
+            <a:r>
+              <a:rPr lang="en-US" b="1" dirty="0"/>
+              <a:t>Hands-on: Reusing messages</a:t>
+            </a:r>
+            <a:endParaRPr lang="en-NL" b="1" dirty="0"/>
+          </a:p>
+        </p:txBody>
+      </p:sp>
+      <p:sp>
+        <p:nvSpPr>
+          <p:cNvPr id="3" name="Content Placeholder 2">
+            <a:extLst>
+              <a:ext uri="{FF2B5EF4-FFF2-40B4-BE49-F238E27FC236}">
+                <a16:creationId xmlns:a16="http://schemas.microsoft.com/office/drawing/2014/main" id="{B7E5CA6D-D83C-4F14-841A-1F3902B3B2AC}"/>
+              </a:ext>
+            </a:extLst>
+          </p:cNvPr>
+          <p:cNvSpPr>
+            <a:spLocks noGrp="1"/>
+          </p:cNvSpPr>
+          <p:nvPr>
+            <p:ph idx="1"/>
+          </p:nvPr>
+        </p:nvSpPr>
+        <p:spPr>
+          <a:xfrm>
+            <a:off x="249766" y="1325186"/>
+            <a:ext cx="11826620" cy="4899039"/>
+          </a:xfrm>
+        </p:spPr>
+        <p:txBody>
+          <a:bodyPr>
+            <a:normAutofit fontScale="92500" lnSpcReduction="10000"/>
+          </a:bodyPr>
+          <a:lstStyle/>
+          <a:p>
+            <a:r>
+              <a:rPr lang="en-US" dirty="0"/>
+              <a:t>All files in:  </a:t>
+            </a:r>
+            <a:r>
+              <a:rPr lang="en-US" b="1" dirty="0">
+                <a:latin typeface="Courier New" panose="02070309020205020404" pitchFamily="49" charset="0"/>
+                <a:cs typeface="Courier New" panose="02070309020205020404" pitchFamily="49" charset="0"/>
+              </a:rPr>
+              <a:t>…/exercises</a:t>
+            </a:r>
+            <a:r>
+              <a:rPr lang="en-US" dirty="0">
+                <a:latin typeface="Courier New" panose="02070309020205020404" pitchFamily="49" charset="0"/>
+                <a:cs typeface="Courier New" panose="02070309020205020404" pitchFamily="49" charset="0"/>
+              </a:rPr>
+              <a:t>/</a:t>
+            </a:r>
+            <a:r>
+              <a:rPr lang="en-US" b="1" dirty="0">
+                <a:latin typeface="Courier New" panose="02070309020205020404" pitchFamily="49" charset="0"/>
+                <a:cs typeface="Courier New" panose="02070309020205020404" pitchFamily="49" charset="0"/>
+              </a:rPr>
+              <a:t>exercise-03-03</a:t>
+            </a:r>
+          </a:p>
+          <a:p>
+            <a:endParaRPr lang="en-US" dirty="0"/>
+          </a:p>
+          <a:p>
+            <a:r>
+              <a:rPr lang="en-US" dirty="0"/>
+              <a:t>Read the instructions in:  </a:t>
+            </a:r>
+            <a:r>
+              <a:rPr lang="en-US" b="1" dirty="0">
+                <a:latin typeface="Courier New" panose="02070309020205020404" pitchFamily="49" charset="0"/>
+                <a:cs typeface="Courier New" panose="02070309020205020404" pitchFamily="49" charset="0"/>
+              </a:rPr>
+              <a:t>instructions.pdf</a:t>
+            </a:r>
+            <a:endParaRPr lang="en-US" dirty="0"/>
+          </a:p>
+          <a:p>
+            <a:r>
+              <a:rPr lang="en-US" dirty="0"/>
+              <a:t>Open the files:</a:t>
+            </a:r>
+          </a:p>
+          <a:p>
+            <a:pPr lvl="1"/>
+            <a:r>
+              <a:rPr lang="en-US" dirty="0"/>
+              <a:t>Document to validate: </a:t>
+            </a:r>
+            <a:r>
+              <a:rPr lang="en-US" b="1" dirty="0">
+                <a:latin typeface="Courier New" panose="02070309020205020404" pitchFamily="49" charset="0"/>
+                <a:cs typeface="Courier New" panose="02070309020205020404" pitchFamily="49" charset="0"/>
+              </a:rPr>
+              <a:t>input.xml</a:t>
+            </a:r>
+          </a:p>
+          <a:p>
+            <a:pPr lvl="1"/>
+            <a:r>
+              <a:rPr lang="en-US" dirty="0"/>
+              <a:t>Template Schematron schema: </a:t>
+            </a:r>
+            <a:r>
+              <a:rPr lang="en-US" b="1" dirty="0" err="1">
+                <a:latin typeface="Courier New" panose="02070309020205020404" pitchFamily="49" charset="0"/>
+                <a:cs typeface="Courier New" panose="02070309020205020404" pitchFamily="49" charset="0"/>
+              </a:rPr>
+              <a:t>template.sch</a:t>
+            </a:r>
+            <a:endParaRPr lang="en-US" b="1" dirty="0">
+              <a:latin typeface="Courier New" panose="02070309020205020404" pitchFamily="49" charset="0"/>
+              <a:cs typeface="Courier New" panose="02070309020205020404" pitchFamily="49" charset="0"/>
+            </a:endParaRPr>
+          </a:p>
+          <a:p>
+            <a:r>
+              <a:rPr lang="en-US" dirty="0"/>
+              <a:t>Enhance </a:t>
+            </a:r>
+            <a:r>
+              <a:rPr lang="en-US" b="1" dirty="0" err="1">
+                <a:latin typeface="Courier New" panose="02070309020205020404" pitchFamily="49" charset="0"/>
+                <a:cs typeface="Courier New" panose="02070309020205020404" pitchFamily="49" charset="0"/>
+              </a:rPr>
+              <a:t>template.sch</a:t>
+            </a:r>
+            <a:r>
+              <a:rPr lang="en-US" dirty="0"/>
+              <a:t> according to the instructions </a:t>
+            </a:r>
+          </a:p>
+          <a:p>
+            <a:r>
+              <a:rPr lang="en-US" dirty="0"/>
+              <a:t>To try it out in oXygen, </a:t>
+            </a:r>
+            <a:r>
+              <a:rPr lang="en-US" b="1" dirty="0">
+                <a:latin typeface="Courier New" panose="02070309020205020404" pitchFamily="49" charset="0"/>
+                <a:cs typeface="Courier New" panose="02070309020205020404" pitchFamily="49" charset="0"/>
+              </a:rPr>
+              <a:t>input.xml</a:t>
+            </a:r>
+            <a:r>
+              <a:rPr lang="en-US" dirty="0"/>
+              <a:t> is automatically validated by </a:t>
+            </a:r>
+            <a:r>
+              <a:rPr lang="en-US" b="1" dirty="0" err="1">
+                <a:latin typeface="Courier New" panose="02070309020205020404" pitchFamily="49" charset="0"/>
+                <a:cs typeface="Courier New" panose="02070309020205020404" pitchFamily="49" charset="0"/>
+              </a:rPr>
+              <a:t>template.sch</a:t>
+            </a:r>
+            <a:endParaRPr lang="en-US" b="1" dirty="0">
+              <a:latin typeface="Courier New" panose="02070309020205020404" pitchFamily="49" charset="0"/>
+              <a:cs typeface="Courier New" panose="02070309020205020404" pitchFamily="49" charset="0"/>
+            </a:endParaRPr>
+          </a:p>
+          <a:p>
+            <a:endParaRPr lang="en-US" dirty="0"/>
+          </a:p>
+          <a:p>
+            <a:endParaRPr lang="en-US" dirty="0"/>
+          </a:p>
+          <a:p>
+            <a:pPr marL="0" indent="0">
+              <a:buNone/>
+            </a:pPr>
+            <a:r>
+              <a:rPr lang="en-US" sz="2200" dirty="0"/>
+              <a:t>Possible solution in: </a:t>
+            </a:r>
+            <a:r>
+              <a:rPr lang="en-US" sz="2200" b="1" dirty="0">
+                <a:latin typeface="Courier New" panose="02070309020205020404" pitchFamily="49" charset="0"/>
+                <a:cs typeface="Courier New" panose="02070309020205020404" pitchFamily="49" charset="0"/>
+              </a:rPr>
+              <a:t>solution/</a:t>
+            </a:r>
+            <a:r>
+              <a:rPr lang="en-US" sz="2200" b="1" dirty="0" err="1">
+                <a:latin typeface="Courier New" panose="02070309020205020404" pitchFamily="49" charset="0"/>
+                <a:cs typeface="Courier New" panose="02070309020205020404" pitchFamily="49" charset="0"/>
+              </a:rPr>
+              <a:t>solution.sch</a:t>
+            </a:r>
+            <a:r>
+              <a:rPr lang="en-US" sz="2200" dirty="0"/>
+              <a:t> (short explanation in </a:t>
+            </a:r>
+            <a:r>
+              <a:rPr lang="en-US" sz="2200" b="1" dirty="0">
+                <a:latin typeface="Courier New" panose="02070309020205020404" pitchFamily="49" charset="0"/>
+                <a:cs typeface="Courier New" panose="02070309020205020404" pitchFamily="49" charset="0"/>
+              </a:rPr>
+              <a:t>solution/explanation.pdf</a:t>
+            </a:r>
+            <a:r>
+              <a:rPr lang="en-US" sz="2200" dirty="0"/>
+              <a:t>).</a:t>
+            </a:r>
+          </a:p>
+          <a:p>
+            <a:pPr marL="0" indent="0">
+              <a:buNone/>
+            </a:pPr>
+            <a:endParaRPr lang="en-US" sz="2200" dirty="0"/>
+          </a:p>
+          <a:p>
+            <a:endParaRPr lang="en-GB" dirty="0"/>
+          </a:p>
+        </p:txBody>
+      </p:sp>
+      <p:pic>
+        <p:nvPicPr>
+          <p:cNvPr id="6" name="Graphic 5" descr="Right pointing backhand index ">
+            <a:extLst>
+              <a:ext uri="{FF2B5EF4-FFF2-40B4-BE49-F238E27FC236}">
+                <a16:creationId xmlns:a16="http://schemas.microsoft.com/office/drawing/2014/main" id="{BA7FB8C5-2AEE-41C3-980A-64845E036DE8}"/>
+              </a:ext>
+            </a:extLst>
+          </p:cNvPr>
+          <p:cNvPicPr>
+            <a:picLocks noChangeAspect="1"/>
+          </p:cNvPicPr>
+          <p:nvPr/>
+        </p:nvPicPr>
+        <p:blipFill>
+          <a:blip r:embed="rId3">
+            <a:extLst>
+              <a:ext uri="{28A0092B-C50C-407E-A947-70E740481C1C}">
+                <a14:useLocalDpi xmlns:a14="http://schemas.microsoft.com/office/drawing/2010/main" val="0"/>
+              </a:ext>
+              <a:ext uri="{96DAC541-7B7A-43D3-8B79-37D633B846F1}">
+                <asvg:svgBlip xmlns:asvg="http://schemas.microsoft.com/office/drawing/2016/SVG/main" r:embed="rId4"/>
+              </a:ext>
+            </a:extLst>
+          </a:blip>
+          <a:stretch>
+            <a:fillRect/>
+          </a:stretch>
+        </p:blipFill>
+        <p:spPr>
+          <a:xfrm>
+            <a:off x="249766" y="26404"/>
+            <a:ext cx="914400" cy="914400"/>
+          </a:xfrm>
+          <a:prstGeom prst="rect">
+            <a:avLst/>
+          </a:prstGeom>
+        </p:spPr>
+      </p:pic>
+    </p:spTree>
+    <p:extLst>
+      <p:ext uri="{BB962C8B-B14F-4D97-AF65-F5344CB8AC3E}">
+        <p14:creationId xmlns:p14="http://schemas.microsoft.com/office/powerpoint/2010/main" val="336471784"/>
+      </p:ext>
+    </p:extLst>
+  </p:cSld>
+  <p:clrMapOvr>
+    <a:masterClrMapping/>
+  </p:clrMapOvr>
+</p:sld>
+</file>
+
+<file path=ppt/slides/slide35.xml><?xml version="1.0" encoding="utf-8"?>
+<p:sld xmlns:a="http://schemas.openxmlformats.org/drawingml/2006/main" xmlns:r="http://schemas.openxmlformats.org/officeDocument/2006/relationships" xmlns:p="http://schemas.openxmlformats.org/presentationml/2006/main">
+  <p:cSld>
+    <p:spTree>
+      <p:nvGrpSpPr>
+        <p:cNvPr id="1" name=""/>
+        <p:cNvGrpSpPr/>
+        <p:nvPr/>
+      </p:nvGrpSpPr>
+      <p:grpSpPr>
+        <a:xfrm>
+          <a:off x="0" y="0"/>
+          <a:ext cx="0" cy="0"/>
+          <a:chOff x="0" y="0"/>
+          <a:chExt cx="0" cy="0"/>
+        </a:xfrm>
+      </p:grpSpPr>
       <p:pic>
         <p:nvPicPr>
           <p:cNvPr id="4" name="Picture 2">
@@ -15070,7 +17337,7 @@
 </p:sld>
 </file>
 
-<file path=ppt/slides/slide31.xml><?xml version="1.0" encoding="utf-8"?>
+<file path=ppt/slides/slide36.xml><?xml version="1.0" encoding="utf-8"?>
 <p:sld xmlns:a="http://schemas.openxmlformats.org/drawingml/2006/main" xmlns:r="http://schemas.openxmlformats.org/officeDocument/2006/relationships" xmlns:p="http://schemas.openxmlformats.org/presentationml/2006/main">
   <p:cSld>
     <p:spTree>
@@ -16037,7 +18304,7 @@
 </p:sld>
 </file>
 
-<file path=ppt/slides/slide32.xml><?xml version="1.0" encoding="utf-8"?>
+<file path=ppt/slides/slide37.xml><?xml version="1.0" encoding="utf-8"?>
 <p:sld xmlns:a="http://schemas.openxmlformats.org/drawingml/2006/main" xmlns:r="http://schemas.openxmlformats.org/officeDocument/2006/relationships" xmlns:p="http://schemas.openxmlformats.org/presentationml/2006/main">
   <p:cSld>
     <p:spTree>
@@ -16688,7 +18955,7 @@
 </p:sld>
 </file>
 
-<file path=ppt/slides/slide33.xml><?xml version="1.0" encoding="utf-8"?>
+<file path=ppt/slides/slide38.xml><?xml version="1.0" encoding="utf-8"?>
 <p:sld xmlns:a="http://schemas.openxmlformats.org/drawingml/2006/main" xmlns:r="http://schemas.openxmlformats.org/officeDocument/2006/relationships" xmlns:p="http://schemas.openxmlformats.org/presentationml/2006/main">
   <p:cSld>
     <p:spTree>
@@ -16869,7 +19136,7 @@
 </p:sld>
 </file>
 
-<file path=ppt/slides/slide34.xml><?xml version="1.0" encoding="utf-8"?>
+<file path=ppt/slides/slide39.xml><?xml version="1.0" encoding="utf-8"?>
 <p:sld xmlns:a="http://schemas.openxmlformats.org/drawingml/2006/main" xmlns:r="http://schemas.openxmlformats.org/officeDocument/2006/relationships" xmlns:p="http://schemas.openxmlformats.org/presentationml/2006/main">
   <p:cSld>
     <p:spTree>
@@ -17093,7 +19360,282 @@
 </p:sld>
 </file>
 
-<file path=ppt/slides/slide35.xml><?xml version="1.0" encoding="utf-8"?>
+<file path=ppt/slides/slide4.xml><?xml version="1.0" encoding="utf-8"?>
+<p:sld xmlns:a="http://schemas.openxmlformats.org/drawingml/2006/main" xmlns:r="http://schemas.openxmlformats.org/officeDocument/2006/relationships" xmlns:p="http://schemas.openxmlformats.org/presentationml/2006/main">
+  <p:cSld>
+    <p:spTree>
+      <p:nvGrpSpPr>
+        <p:cNvPr id="1" name=""/>
+        <p:cNvGrpSpPr/>
+        <p:nvPr/>
+      </p:nvGrpSpPr>
+      <p:grpSpPr>
+        <a:xfrm>
+          <a:off x="0" y="0"/>
+          <a:ext cx="0" cy="0"/>
+          <a:chOff x="0" y="0"/>
+          <a:chExt cx="0" cy="0"/>
+        </a:xfrm>
+      </p:grpSpPr>
+      <p:sp>
+        <p:nvSpPr>
+          <p:cNvPr id="2" name="Title 1">
+            <a:extLst>
+              <a:ext uri="{FF2B5EF4-FFF2-40B4-BE49-F238E27FC236}">
+                <a16:creationId xmlns:a16="http://schemas.microsoft.com/office/drawing/2014/main" id="{DA1B0687-9FA5-4319-911B-AD25E7C55984}"/>
+              </a:ext>
+            </a:extLst>
+          </p:cNvPr>
+          <p:cNvSpPr>
+            <a:spLocks noGrp="1"/>
+          </p:cNvSpPr>
+          <p:nvPr>
+            <p:ph type="title"/>
+          </p:nvPr>
+        </p:nvSpPr>
+        <p:spPr>
+          <a:xfrm>
+            <a:off x="114149" y="14123"/>
+            <a:ext cx="10515600" cy="1325563"/>
+          </a:xfrm>
+        </p:spPr>
+        <p:txBody>
+          <a:bodyPr/>
+          <a:lstStyle/>
+          <a:p>
+            <a:r>
+              <a:rPr lang="en-US" b="1" dirty="0"/>
+              <a:t>Schematron highlights</a:t>
+            </a:r>
+            <a:endParaRPr lang="en-NL" b="1" dirty="0"/>
+          </a:p>
+        </p:txBody>
+      </p:sp>
+      <p:sp>
+        <p:nvSpPr>
+          <p:cNvPr id="3" name="Content Placeholder 2">
+            <a:extLst>
+              <a:ext uri="{FF2B5EF4-FFF2-40B4-BE49-F238E27FC236}">
+                <a16:creationId xmlns:a16="http://schemas.microsoft.com/office/drawing/2014/main" id="{35759DFE-054C-462C-8123-0C8D2411A9D6}"/>
+              </a:ext>
+            </a:extLst>
+          </p:cNvPr>
+          <p:cNvSpPr>
+            <a:spLocks noGrp="1"/>
+          </p:cNvSpPr>
+          <p:nvPr>
+            <p:ph idx="1"/>
+          </p:nvPr>
+        </p:nvSpPr>
+        <p:spPr>
+          <a:xfrm>
+            <a:off x="800751" y="1601865"/>
+            <a:ext cx="10515600" cy="3761987"/>
+          </a:xfrm>
+        </p:spPr>
+        <p:txBody>
+          <a:bodyPr>
+            <a:normAutofit fontScale="85000" lnSpcReduction="20000"/>
+          </a:bodyPr>
+          <a:lstStyle/>
+          <a:p>
+            <a:r>
+              <a:rPr lang="en-US" dirty="0"/>
+              <a:t>A formal XML based schema language</a:t>
+            </a:r>
+          </a:p>
+          <a:p>
+            <a:r>
+              <a:rPr lang="en-US" dirty="0"/>
+              <a:t>Simple but powerful</a:t>
+            </a:r>
+          </a:p>
+          <a:p>
+            <a:r>
+              <a:rPr lang="en-US" dirty="0"/>
+              <a:t>Can go way beyond the "classic" validation languages</a:t>
+            </a:r>
+          </a:p>
+          <a:p>
+            <a:r>
+              <a:rPr lang="en-US" dirty="0"/>
+              <a:t>Two types of rules:</a:t>
+            </a:r>
+          </a:p>
+          <a:p>
+            <a:pPr lvl="1"/>
+            <a:r>
+              <a:rPr lang="en-US" dirty="0"/>
+              <a:t>Assertions</a:t>
+            </a:r>
+          </a:p>
+          <a:p>
+            <a:pPr lvl="1"/>
+            <a:r>
+              <a:rPr lang="en-US" dirty="0"/>
+              <a:t>Reports</a:t>
+            </a:r>
+          </a:p>
+          <a:p>
+            <a:r>
+              <a:rPr lang="en-US" dirty="0"/>
+              <a:t>Messages in your own words!</a:t>
+            </a:r>
+          </a:p>
+          <a:p>
+            <a:r>
+              <a:rPr lang="en-US" dirty="0"/>
+              <a:t>XPath based expressions</a:t>
+            </a:r>
+          </a:p>
+          <a:p>
+            <a:r>
+              <a:rPr lang="en-US" dirty="0"/>
+              <a:t>Incorporates XSLT keys and functions</a:t>
+            </a:r>
+          </a:p>
+          <a:p>
+            <a:r>
+              <a:rPr lang="en-US" dirty="0"/>
+              <a:t>Has a predefined XML based output format (SVRL)</a:t>
+            </a:r>
+          </a:p>
+        </p:txBody>
+      </p:sp>
+      <p:sp>
+        <p:nvSpPr>
+          <p:cNvPr id="4" name="Speech Bubble: Oval 3">
+            <a:extLst>
+              <a:ext uri="{FF2B5EF4-FFF2-40B4-BE49-F238E27FC236}">
+                <a16:creationId xmlns:a16="http://schemas.microsoft.com/office/drawing/2014/main" id="{2721F1B1-1297-4F86-95C5-A246308E3BA4}"/>
+              </a:ext>
+            </a:extLst>
+          </p:cNvPr>
+          <p:cNvSpPr/>
+          <p:nvPr/>
+        </p:nvSpPr>
+        <p:spPr>
+          <a:xfrm>
+            <a:off x="7672093" y="5475822"/>
+            <a:ext cx="3368557" cy="951978"/>
+          </a:xfrm>
+          <a:prstGeom prst="wedgeEllipseCallout">
+            <a:avLst>
+              <a:gd name="adj1" fmla="val 71462"/>
+              <a:gd name="adj2" fmla="val 60972"/>
+            </a:avLst>
+          </a:prstGeom>
+        </p:spPr>
+        <p:style>
+          <a:lnRef idx="2">
+            <a:schemeClr val="accent1">
+              <a:shade val="50000"/>
+            </a:schemeClr>
+          </a:lnRef>
+          <a:fillRef idx="1">
+            <a:schemeClr val="accent1"/>
+          </a:fillRef>
+          <a:effectRef idx="0">
+            <a:schemeClr val="accent1"/>
+          </a:effectRef>
+          <a:fontRef idx="minor">
+            <a:schemeClr val="lt1"/>
+          </a:fontRef>
+        </p:style>
+        <p:txBody>
+          <a:bodyPr rtlCol="0" anchor="ctr"/>
+          <a:lstStyle/>
+          <a:p>
+            <a:pPr algn="ctr"/>
+            <a:r>
+              <a:rPr lang="en-US" dirty="0"/>
+              <a:t>I'm the </a:t>
+            </a:r>
+            <a:r>
+              <a:rPr lang="en-US" dirty="0" err="1"/>
+              <a:t>Schematroll</a:t>
+            </a:r>
+            <a:endParaRPr lang="en-US" dirty="0"/>
+          </a:p>
+          <a:p>
+            <a:pPr algn="ctr"/>
+            <a:r>
+              <a:rPr lang="en-US" dirty="0"/>
+              <a:t>I'm </a:t>
+            </a:r>
+            <a:r>
+              <a:rPr lang="en-US" dirty="0" err="1"/>
+              <a:t>Schematron's</a:t>
+            </a:r>
+            <a:r>
+              <a:rPr lang="en-US" dirty="0"/>
+              <a:t> logo!</a:t>
+            </a:r>
+            <a:endParaRPr lang="en-NL" dirty="0"/>
+          </a:p>
+        </p:txBody>
+      </p:sp>
+      <p:pic>
+        <p:nvPicPr>
+          <p:cNvPr id="2050" name="Picture 2" descr="Schematron | Schematron">
+            <a:extLst>
+              <a:ext uri="{FF2B5EF4-FFF2-40B4-BE49-F238E27FC236}">
+                <a16:creationId xmlns:a16="http://schemas.microsoft.com/office/drawing/2014/main" id="{89AEA9ED-0CB1-C07D-F2A8-3C4341491028}"/>
+              </a:ext>
+            </a:extLst>
+          </p:cNvPr>
+          <p:cNvPicPr>
+            <a:picLocks noChangeAspect="1" noChangeArrowheads="1"/>
+          </p:cNvPicPr>
+          <p:nvPr/>
+        </p:nvPicPr>
+        <p:blipFill>
+          <a:blip r:embed="rId2">
+            <a:extLst>
+              <a:ext uri="{28A0092B-C50C-407E-A947-70E740481C1C}">
+                <a14:useLocalDpi xmlns:a14="http://schemas.microsoft.com/office/drawing/2010/main" val="0"/>
+              </a:ext>
+            </a:extLst>
+          </a:blip>
+          <a:srcRect/>
+          <a:stretch>
+            <a:fillRect/>
+          </a:stretch>
+        </p:blipFill>
+        <p:spPr bwMode="auto">
+          <a:xfrm rot="1489992">
+            <a:off x="5808579" y="1739640"/>
+            <a:ext cx="6581775" cy="1571625"/>
+          </a:xfrm>
+          <a:prstGeom prst="rect">
+            <a:avLst/>
+          </a:prstGeom>
+          <a:noFill/>
+          <a:extLst>
+            <a:ext uri="{909E8E84-426E-40DD-AFC4-6F175D3DCCD1}">
+              <a14:hiddenFill xmlns:a14="http://schemas.microsoft.com/office/drawing/2010/main">
+                <a:solidFill>
+                  <a:srgbClr val="FFFFFF"/>
+                </a:solidFill>
+              </a14:hiddenFill>
+            </a:ext>
+          </a:extLst>
+        </p:spPr>
+      </p:pic>
+    </p:spTree>
+    <p:extLst>
+      <p:ext uri="{BB962C8B-B14F-4D97-AF65-F5344CB8AC3E}">
+        <p14:creationId xmlns:p14="http://schemas.microsoft.com/office/powerpoint/2010/main" val="545629648"/>
+      </p:ext>
+    </p:extLst>
+  </p:cSld>
+  <p:clrMapOvr>
+    <a:masterClrMapping/>
+  </p:clrMapOvr>
+</p:sld>
+</file>
+
+<file path=ppt/slides/slide40.xml><?xml version="1.0" encoding="utf-8"?>
 <p:sld xmlns:a="http://schemas.openxmlformats.org/drawingml/2006/main" xmlns:r="http://schemas.openxmlformats.org/officeDocument/2006/relationships" xmlns:p="http://schemas.openxmlformats.org/presentationml/2006/main">
   <p:cSld>
     <p:spTree>
@@ -18017,7 +20559,7 @@
 </p:sld>
 </file>
 
-<file path=ppt/slides/slide36.xml><?xml version="1.0" encoding="utf-8"?>
+<file path=ppt/slides/slide41.xml><?xml version="1.0" encoding="utf-8"?>
 <p:sld xmlns:a="http://schemas.openxmlformats.org/drawingml/2006/main" xmlns:r="http://schemas.openxmlformats.org/officeDocument/2006/relationships" xmlns:p="http://schemas.openxmlformats.org/presentationml/2006/main">
   <p:cSld>
     <p:spTree>
@@ -18722,7 +21264,7 @@
 </p:sld>
 </file>
 
-<file path=ppt/slides/slide37.xml><?xml version="1.0" encoding="utf-8"?>
+<file path=ppt/slides/slide42.xml><?xml version="1.0" encoding="utf-8"?>
 <p:sld xmlns:a="http://schemas.openxmlformats.org/drawingml/2006/main" xmlns:r="http://schemas.openxmlformats.org/officeDocument/2006/relationships" xmlns:p="http://schemas.openxmlformats.org/presentationml/2006/main">
   <p:cSld>
     <p:spTree>
@@ -19794,7 +22336,7 @@
 </p:sld>
 </file>
 
-<file path=ppt/slides/slide38.xml><?xml version="1.0" encoding="utf-8"?>
+<file path=ppt/slides/slide43.xml><?xml version="1.0" encoding="utf-8"?>
 <p:sld xmlns:a="http://schemas.openxmlformats.org/drawingml/2006/main" xmlns:r="http://schemas.openxmlformats.org/officeDocument/2006/relationships" xmlns:p="http://schemas.openxmlformats.org/presentationml/2006/main">
   <p:cSld>
     <p:spTree>
@@ -20342,7 +22884,7 @@
 </p:sld>
 </file>
 
-<file path=ppt/slides/slide39.xml><?xml version="1.0" encoding="utf-8"?>
+<file path=ppt/slides/slide44.xml><?xml version="1.0" encoding="utf-8"?>
 <p:sld xmlns:a="http://schemas.openxmlformats.org/drawingml/2006/main" xmlns:r="http://schemas.openxmlformats.org/officeDocument/2006/relationships" xmlns:p="http://schemas.openxmlformats.org/presentationml/2006/main">
   <p:cSld>
     <p:spTree>
@@ -20654,7 +23196,7 @@
 </p:sld>
 </file>
 
-<file path=ppt/slides/slide4.xml><?xml version="1.0" encoding="utf-8"?>
+<file path=ppt/slides/slide45.xml><?xml version="1.0" encoding="utf-8"?>
 <p:sld xmlns:a="http://schemas.openxmlformats.org/drawingml/2006/main" xmlns:r="http://schemas.openxmlformats.org/officeDocument/2006/relationships" xmlns:p="http://schemas.openxmlformats.org/presentationml/2006/main">
   <p:cSld>
     <p:spTree>
@@ -20676,281 +23218,6 @@
           <p:cNvPr id="2" name="Title 1">
             <a:extLst>
               <a:ext uri="{FF2B5EF4-FFF2-40B4-BE49-F238E27FC236}">
-                <a16:creationId xmlns:a16="http://schemas.microsoft.com/office/drawing/2014/main" id="{DA1B0687-9FA5-4319-911B-AD25E7C55984}"/>
-              </a:ext>
-            </a:extLst>
-          </p:cNvPr>
-          <p:cNvSpPr>
-            <a:spLocks noGrp="1"/>
-          </p:cNvSpPr>
-          <p:nvPr>
-            <p:ph type="title"/>
-          </p:nvPr>
-        </p:nvSpPr>
-        <p:spPr>
-          <a:xfrm>
-            <a:off x="114149" y="14123"/>
-            <a:ext cx="10515600" cy="1325563"/>
-          </a:xfrm>
-        </p:spPr>
-        <p:txBody>
-          <a:bodyPr/>
-          <a:lstStyle/>
-          <a:p>
-            <a:r>
-              <a:rPr lang="en-US" b="1" dirty="0"/>
-              <a:t>Schematron highlights</a:t>
-            </a:r>
-            <a:endParaRPr lang="en-NL" b="1" dirty="0"/>
-          </a:p>
-        </p:txBody>
-      </p:sp>
-      <p:sp>
-        <p:nvSpPr>
-          <p:cNvPr id="3" name="Content Placeholder 2">
-            <a:extLst>
-              <a:ext uri="{FF2B5EF4-FFF2-40B4-BE49-F238E27FC236}">
-                <a16:creationId xmlns:a16="http://schemas.microsoft.com/office/drawing/2014/main" id="{35759DFE-054C-462C-8123-0C8D2411A9D6}"/>
-              </a:ext>
-            </a:extLst>
-          </p:cNvPr>
-          <p:cNvSpPr>
-            <a:spLocks noGrp="1"/>
-          </p:cNvSpPr>
-          <p:nvPr>
-            <p:ph idx="1"/>
-          </p:nvPr>
-        </p:nvSpPr>
-        <p:spPr>
-          <a:xfrm>
-            <a:off x="800751" y="1601865"/>
-            <a:ext cx="10515600" cy="3761987"/>
-          </a:xfrm>
-        </p:spPr>
-        <p:txBody>
-          <a:bodyPr>
-            <a:normAutofit fontScale="85000" lnSpcReduction="20000"/>
-          </a:bodyPr>
-          <a:lstStyle/>
-          <a:p>
-            <a:r>
-              <a:rPr lang="en-US" dirty="0"/>
-              <a:t>Simple but powerful</a:t>
-            </a:r>
-          </a:p>
-          <a:p>
-            <a:r>
-              <a:rPr lang="en-US" dirty="0"/>
-              <a:t>A formal XML based schema language</a:t>
-            </a:r>
-          </a:p>
-          <a:p>
-            <a:r>
-              <a:rPr lang="en-US" dirty="0"/>
-              <a:t>Two types of rules:</a:t>
-            </a:r>
-          </a:p>
-          <a:p>
-            <a:pPr lvl="1"/>
-            <a:r>
-              <a:rPr lang="en-US" dirty="0"/>
-              <a:t>Assertions</a:t>
-            </a:r>
-          </a:p>
-          <a:p>
-            <a:pPr lvl="1"/>
-            <a:r>
-              <a:rPr lang="en-US" dirty="0"/>
-              <a:t>Reports</a:t>
-            </a:r>
-          </a:p>
-          <a:p>
-            <a:r>
-              <a:rPr lang="en-US" dirty="0"/>
-              <a:t>Messages in your own words!</a:t>
-            </a:r>
-          </a:p>
-          <a:p>
-            <a:r>
-              <a:rPr lang="en-US" dirty="0"/>
-              <a:t>XPath based expressions</a:t>
-            </a:r>
-          </a:p>
-          <a:p>
-            <a:r>
-              <a:rPr lang="en-US" dirty="0"/>
-              <a:t>Incorporate XSLT keys and functions</a:t>
-            </a:r>
-          </a:p>
-          <a:p>
-            <a:r>
-              <a:rPr lang="en-US" dirty="0"/>
-              <a:t>Can go way beyond the "classic" validation languages</a:t>
-            </a:r>
-          </a:p>
-          <a:p>
-            <a:r>
-              <a:rPr lang="en-US" dirty="0"/>
-              <a:t>Has a predefined XML based output format (SVRL)</a:t>
-            </a:r>
-          </a:p>
-        </p:txBody>
-      </p:sp>
-      <p:sp>
-        <p:nvSpPr>
-          <p:cNvPr id="4" name="Speech Bubble: Oval 3">
-            <a:extLst>
-              <a:ext uri="{FF2B5EF4-FFF2-40B4-BE49-F238E27FC236}">
-                <a16:creationId xmlns:a16="http://schemas.microsoft.com/office/drawing/2014/main" id="{2721F1B1-1297-4F86-95C5-A246308E3BA4}"/>
-              </a:ext>
-            </a:extLst>
-          </p:cNvPr>
-          <p:cNvSpPr/>
-          <p:nvPr/>
-        </p:nvSpPr>
-        <p:spPr>
-          <a:xfrm>
-            <a:off x="7672093" y="5475822"/>
-            <a:ext cx="3368557" cy="951978"/>
-          </a:xfrm>
-          <a:prstGeom prst="wedgeEllipseCallout">
-            <a:avLst>
-              <a:gd name="adj1" fmla="val 71462"/>
-              <a:gd name="adj2" fmla="val 60972"/>
-            </a:avLst>
-          </a:prstGeom>
-        </p:spPr>
-        <p:style>
-          <a:lnRef idx="2">
-            <a:schemeClr val="accent1">
-              <a:shade val="50000"/>
-            </a:schemeClr>
-          </a:lnRef>
-          <a:fillRef idx="1">
-            <a:schemeClr val="accent1"/>
-          </a:fillRef>
-          <a:effectRef idx="0">
-            <a:schemeClr val="accent1"/>
-          </a:effectRef>
-          <a:fontRef idx="minor">
-            <a:schemeClr val="lt1"/>
-          </a:fontRef>
-        </p:style>
-        <p:txBody>
-          <a:bodyPr rtlCol="0" anchor="ctr"/>
-          <a:lstStyle/>
-          <a:p>
-            <a:pPr algn="ctr"/>
-            <a:r>
-              <a:rPr lang="en-US" dirty="0"/>
-              <a:t>I'm the </a:t>
-            </a:r>
-            <a:r>
-              <a:rPr lang="en-US" dirty="0" err="1"/>
-              <a:t>Schematroll</a:t>
-            </a:r>
-            <a:endParaRPr lang="en-US" dirty="0"/>
-          </a:p>
-          <a:p>
-            <a:pPr algn="ctr"/>
-            <a:r>
-              <a:rPr lang="en-US" dirty="0"/>
-              <a:t>I'm </a:t>
-            </a:r>
-            <a:r>
-              <a:rPr lang="en-US" dirty="0" err="1"/>
-              <a:t>Schematron's</a:t>
-            </a:r>
-            <a:r>
-              <a:rPr lang="en-US" dirty="0"/>
-              <a:t> logo!</a:t>
-            </a:r>
-            <a:endParaRPr lang="en-NL" dirty="0"/>
-          </a:p>
-        </p:txBody>
-      </p:sp>
-      <p:pic>
-        <p:nvPicPr>
-          <p:cNvPr id="2050" name="Picture 2" descr="Schematron | Schematron">
-            <a:extLst>
-              <a:ext uri="{FF2B5EF4-FFF2-40B4-BE49-F238E27FC236}">
-                <a16:creationId xmlns:a16="http://schemas.microsoft.com/office/drawing/2014/main" id="{89AEA9ED-0CB1-C07D-F2A8-3C4341491028}"/>
-              </a:ext>
-            </a:extLst>
-          </p:cNvPr>
-          <p:cNvPicPr>
-            <a:picLocks noChangeAspect="1" noChangeArrowheads="1"/>
-          </p:cNvPicPr>
-          <p:nvPr/>
-        </p:nvPicPr>
-        <p:blipFill>
-          <a:blip r:embed="rId2">
-            <a:extLst>
-              <a:ext uri="{28A0092B-C50C-407E-A947-70E740481C1C}">
-                <a14:useLocalDpi xmlns:a14="http://schemas.microsoft.com/office/drawing/2010/main" val="0"/>
-              </a:ext>
-            </a:extLst>
-          </a:blip>
-          <a:srcRect/>
-          <a:stretch>
-            <a:fillRect/>
-          </a:stretch>
-        </p:blipFill>
-        <p:spPr bwMode="auto">
-          <a:xfrm rot="1489992">
-            <a:off x="5808579" y="1739640"/>
-            <a:ext cx="6581775" cy="1571625"/>
-          </a:xfrm>
-          <a:prstGeom prst="rect">
-            <a:avLst/>
-          </a:prstGeom>
-          <a:noFill/>
-          <a:extLst>
-            <a:ext uri="{909E8E84-426E-40DD-AFC4-6F175D3DCCD1}">
-              <a14:hiddenFill xmlns:a14="http://schemas.microsoft.com/office/drawing/2010/main">
-                <a:solidFill>
-                  <a:srgbClr val="FFFFFF"/>
-                </a:solidFill>
-              </a14:hiddenFill>
-            </a:ext>
-          </a:extLst>
-        </p:spPr>
-      </p:pic>
-    </p:spTree>
-    <p:extLst>
-      <p:ext uri="{BB962C8B-B14F-4D97-AF65-F5344CB8AC3E}">
-        <p14:creationId xmlns:p14="http://schemas.microsoft.com/office/powerpoint/2010/main" val="545629648"/>
-      </p:ext>
-    </p:extLst>
-  </p:cSld>
-  <p:clrMapOvr>
-    <a:masterClrMapping/>
-  </p:clrMapOvr>
-</p:sld>
-</file>
-
-<file path=ppt/slides/slide40.xml><?xml version="1.0" encoding="utf-8"?>
-<p:sld xmlns:a="http://schemas.openxmlformats.org/drawingml/2006/main" xmlns:r="http://schemas.openxmlformats.org/officeDocument/2006/relationships" xmlns:p="http://schemas.openxmlformats.org/presentationml/2006/main">
-  <p:cSld>
-    <p:spTree>
-      <p:nvGrpSpPr>
-        <p:cNvPr id="1" name=""/>
-        <p:cNvGrpSpPr/>
-        <p:nvPr/>
-      </p:nvGrpSpPr>
-      <p:grpSpPr>
-        <a:xfrm>
-          <a:off x="0" y="0"/>
-          <a:ext cx="0" cy="0"/>
-          <a:chOff x="0" y="0"/>
-          <a:chExt cx="0" cy="0"/>
-        </a:xfrm>
-      </p:grpSpPr>
-      <p:sp>
-        <p:nvSpPr>
-          <p:cNvPr id="2" name="Title 1">
-            <a:extLst>
-              <a:ext uri="{FF2B5EF4-FFF2-40B4-BE49-F238E27FC236}">
                 <a16:creationId xmlns:a16="http://schemas.microsoft.com/office/drawing/2014/main" id="{F0C815C8-BE18-DEF3-FFBC-5298E1DF0EBB}"/>
               </a:ext>
             </a:extLst>
@@ -21128,7 +23395,7 @@
 </p:sld>
 </file>
 
-<file path=ppt/slides/slide41.xml><?xml version="1.0" encoding="utf-8"?>
+<file path=ppt/slides/slide46.xml><?xml version="1.0" encoding="utf-8"?>
 <p:sld xmlns:a="http://schemas.openxmlformats.org/drawingml/2006/main" xmlns:r="http://schemas.openxmlformats.org/officeDocument/2006/relationships" xmlns:p="http://schemas.openxmlformats.org/presentationml/2006/main">
   <p:cSld>
     <p:spTree>
@@ -21450,7 +23717,7 @@
 </p:sld>
 </file>
 
-<file path=ppt/slides/slide42.xml><?xml version="1.0" encoding="utf-8"?>
+<file path=ppt/slides/slide47.xml><?xml version="1.0" encoding="utf-8"?>
 <p:sld xmlns:a="http://schemas.openxmlformats.org/drawingml/2006/main" xmlns:r="http://schemas.openxmlformats.org/officeDocument/2006/relationships" xmlns:p="http://schemas.openxmlformats.org/presentationml/2006/main">
   <p:cSld>
     <p:spTree>
@@ -22021,7 +24288,7 @@
 </p:sld>
 </file>
 
-<file path=ppt/slides/slide43.xml><?xml version="1.0" encoding="utf-8"?>
+<file path=ppt/slides/slide48.xml><?xml version="1.0" encoding="utf-8"?>
 <p:sld xmlns:a="http://schemas.openxmlformats.org/drawingml/2006/main" xmlns:r="http://schemas.openxmlformats.org/officeDocument/2006/relationships" xmlns:p="http://schemas.openxmlformats.org/presentationml/2006/main">
   <p:cSld>
     <p:spTree>
@@ -22880,7 +25147,7 @@
         </p:blipFill>
         <p:spPr>
           <a:xfrm>
-            <a:off x="1126504" y="1981499"/>
+            <a:off x="1100228" y="1781505"/>
             <a:ext cx="2031474" cy="1272590"/>
           </a:xfrm>
           <a:prstGeom prst="rect">
@@ -22902,7 +25169,7 @@
         </p:nvSpPr>
         <p:spPr>
           <a:xfrm>
-            <a:off x="2719632" y="2619414"/>
+            <a:off x="2306504" y="2423851"/>
             <a:ext cx="3473777" cy="287517"/>
           </a:xfrm>
           <a:prstGeom prst="leftArrow">
@@ -22956,7 +25223,7 @@
         </p:blipFill>
         <p:spPr>
           <a:xfrm>
-            <a:off x="4170702" y="3174547"/>
+            <a:off x="3870121" y="3008184"/>
             <a:ext cx="390580" cy="390580"/>
           </a:xfrm>
           <a:prstGeom prst="rect">

</xml_diff>